<commit_message>
some slide updates and saved as PDF
</commit_message>
<xml_diff>
--- a/slides/day4_slides.pptx
+++ b/slides/day4_slides.pptx
@@ -5,7 +5,7 @@
     <p:sldMasterId id="2147483660" r:id="rId1"/>
   </p:sldMasterIdLst>
   <p:notesMasterIdLst>
-    <p:notesMasterId r:id="rId52"/>
+    <p:notesMasterId r:id="rId53"/>
   </p:notesMasterIdLst>
   <p:sldIdLst>
     <p:sldId id="256" r:id="rId2"/>
@@ -43,21 +43,22 @@
     <p:sldId id="515" r:id="rId34"/>
     <p:sldId id="518" r:id="rId35"/>
     <p:sldId id="475" r:id="rId36"/>
-    <p:sldId id="478" r:id="rId37"/>
-    <p:sldId id="520" r:id="rId38"/>
-    <p:sldId id="519" r:id="rId39"/>
-    <p:sldId id="483" r:id="rId40"/>
-    <p:sldId id="482" r:id="rId41"/>
-    <p:sldId id="383" r:id="rId42"/>
-    <p:sldId id="488" r:id="rId43"/>
-    <p:sldId id="501" r:id="rId44"/>
-    <p:sldId id="495" r:id="rId45"/>
-    <p:sldId id="502" r:id="rId46"/>
-    <p:sldId id="498" r:id="rId47"/>
-    <p:sldId id="499" r:id="rId48"/>
-    <p:sldId id="494" r:id="rId49"/>
-    <p:sldId id="500" r:id="rId50"/>
-    <p:sldId id="496" r:id="rId51"/>
+    <p:sldId id="523" r:id="rId37"/>
+    <p:sldId id="478" r:id="rId38"/>
+    <p:sldId id="520" r:id="rId39"/>
+    <p:sldId id="519" r:id="rId40"/>
+    <p:sldId id="483" r:id="rId41"/>
+    <p:sldId id="482" r:id="rId42"/>
+    <p:sldId id="383" r:id="rId43"/>
+    <p:sldId id="488" r:id="rId44"/>
+    <p:sldId id="501" r:id="rId45"/>
+    <p:sldId id="495" r:id="rId46"/>
+    <p:sldId id="502" r:id="rId47"/>
+    <p:sldId id="498" r:id="rId48"/>
+    <p:sldId id="499" r:id="rId49"/>
+    <p:sldId id="494" r:id="rId50"/>
+    <p:sldId id="500" r:id="rId51"/>
+    <p:sldId id="496" r:id="rId52"/>
   </p:sldIdLst>
   <p:sldSz cx="9144000" cy="6858000" type="screen4x3"/>
   <p:notesSz cx="6858000" cy="9144000"/>
@@ -241,7 +242,7 @@
           <a:p>
             <a:fld id="{F833E4A7-8C8F-0444-B05A-6DE0ED7B35B0}" type="datetimeFigureOut">
               <a:rPr lang="en-US" smtClean="0"/>
-              <a:t>5/20/15</a:t>
+              <a:t>5/21/15</a:t>
             </a:fld>
             <a:endParaRPr lang="en-US"/>
           </a:p>
@@ -554,14 +555,9 @@
           <a:lstStyle/>
           <a:p>
             <a:r>
-              <a:rPr lang="en-US" dirty="0" err="1" smtClean="0"/>
-              <a:t>dir</a:t>
-            </a:r>
-            <a:r>
-              <a:rPr lang="en-US" dirty="0" smtClean="0"/>
-              <a:t>() demo!!!</a:t>
-            </a:r>
-            <a:endParaRPr lang="en-US" dirty="0"/>
+              <a:rPr lang="en-US"/>
+              <a:t>show demonstration here</a:t>
+            </a:r>
           </a:p>
         </p:txBody>
       </p:sp>
@@ -582,7 +578,7 @@
           <a:p>
             <a:fld id="{850A63CA-6EF3-434A-8E2F-FF8FCBDA0A72}" type="slidenum">
               <a:rPr lang="en-US" smtClean="0"/>
-              <a:t>26</a:t>
+              <a:t>12</a:t>
             </a:fld>
             <a:endParaRPr lang="en-US"/>
           </a:p>
@@ -591,7 +587,7 @@
     </p:spTree>
     <p:extLst>
       <p:ext uri="{BB962C8B-B14F-4D97-AF65-F5344CB8AC3E}">
-        <p14:creationId xmlns:p14="http://schemas.microsoft.com/office/powerpoint/2010/main" val="3303527275"/>
+        <p14:creationId xmlns:p14="http://schemas.microsoft.com/office/powerpoint/2010/main" val="3572603348"/>
       </p:ext>
     </p:extLst>
   </p:cSld>
@@ -646,6 +642,98 @@
           <a:lstStyle/>
           <a:p>
             <a:r>
+              <a:rPr lang="en-US" dirty="0" err="1" smtClean="0"/>
+              <a:t>dir</a:t>
+            </a:r>
+            <a:r>
+              <a:rPr lang="en-US" dirty="0" smtClean="0"/>
+              <a:t>() demo!!!</a:t>
+            </a:r>
+            <a:endParaRPr lang="en-US" dirty="0"/>
+          </a:p>
+        </p:txBody>
+      </p:sp>
+      <p:sp>
+        <p:nvSpPr>
+          <p:cNvPr id="4" name="Slide Number Placeholder 3"/>
+          <p:cNvSpPr>
+            <a:spLocks noGrp="1"/>
+          </p:cNvSpPr>
+          <p:nvPr>
+            <p:ph type="sldNum" sz="quarter" idx="10"/>
+          </p:nvPr>
+        </p:nvSpPr>
+        <p:spPr/>
+        <p:txBody>
+          <a:bodyPr/>
+          <a:lstStyle/>
+          <a:p>
+            <a:fld id="{850A63CA-6EF3-434A-8E2F-FF8FCBDA0A72}" type="slidenum">
+              <a:rPr lang="en-US" smtClean="0"/>
+              <a:t>26</a:t>
+            </a:fld>
+            <a:endParaRPr lang="en-US"/>
+          </a:p>
+        </p:txBody>
+      </p:sp>
+    </p:spTree>
+    <p:extLst>
+      <p:ext uri="{BB962C8B-B14F-4D97-AF65-F5344CB8AC3E}">
+        <p14:creationId xmlns:p14="http://schemas.microsoft.com/office/powerpoint/2010/main" val="3303527275"/>
+      </p:ext>
+    </p:extLst>
+  </p:cSld>
+  <p:clrMapOvr>
+    <a:masterClrMapping/>
+  </p:clrMapOvr>
+</p:notes>
+</file>
+
+<file path=ppt/notesSlides/notesSlide3.xml><?xml version="1.0" encoding="utf-8"?>
+<p:notes xmlns:a="http://schemas.openxmlformats.org/drawingml/2006/main" xmlns:r="http://schemas.openxmlformats.org/officeDocument/2006/relationships" xmlns:p="http://schemas.openxmlformats.org/presentationml/2006/main">
+  <p:cSld>
+    <p:spTree>
+      <p:nvGrpSpPr>
+        <p:cNvPr id="1" name=""/>
+        <p:cNvGrpSpPr/>
+        <p:nvPr/>
+      </p:nvGrpSpPr>
+      <p:grpSpPr>
+        <a:xfrm>
+          <a:off x="0" y="0"/>
+          <a:ext cx="0" cy="0"/>
+          <a:chOff x="0" y="0"/>
+          <a:chExt cx="0" cy="0"/>
+        </a:xfrm>
+      </p:grpSpPr>
+      <p:sp>
+        <p:nvSpPr>
+          <p:cNvPr id="2" name="Slide Image Placeholder 1"/>
+          <p:cNvSpPr>
+            <a:spLocks noGrp="1" noRot="1" noChangeAspect="1"/>
+          </p:cNvSpPr>
+          <p:nvPr>
+            <p:ph type="sldImg"/>
+          </p:nvPr>
+        </p:nvSpPr>
+        <p:spPr/>
+      </p:sp>
+      <p:sp>
+        <p:nvSpPr>
+          <p:cNvPr id="3" name="Notes Placeholder 2"/>
+          <p:cNvSpPr>
+            <a:spLocks noGrp="1"/>
+          </p:cNvSpPr>
+          <p:nvPr>
+            <p:ph type="body" idx="1"/>
+          </p:nvPr>
+        </p:nvSpPr>
+        <p:spPr/>
+        <p:txBody>
+          <a:bodyPr/>
+          <a:lstStyle/>
+          <a:p>
+            <a:r>
               <a:rPr lang="en-US" dirty="0" smtClean="0"/>
               <a:t>demonstration time!</a:t>
             </a:r>
@@ -689,7 +777,7 @@
 </p:notes>
 </file>
 
-<file path=ppt/notesSlides/notesSlide3.xml><?xml version="1.0" encoding="utf-8"?>
+<file path=ppt/notesSlides/notesSlide4.xml><?xml version="1.0" encoding="utf-8"?>
 <p:notes xmlns:a="http://schemas.openxmlformats.org/drawingml/2006/main" xmlns:r="http://schemas.openxmlformats.org/officeDocument/2006/relationships" xmlns:p="http://schemas.openxmlformats.org/presentationml/2006/main">
   <p:cSld>
     <p:spTree>
@@ -970,7 +1058,7 @@
           <a:p>
             <a:fld id="{CAF647BD-C221-1844-9ED2-A7F7759EF665}" type="datetimeFigureOut">
               <a:rPr lang="en-US" smtClean="0"/>
-              <a:t>5/20/15</a:t>
+              <a:t>5/21/15</a:t>
             </a:fld>
             <a:endParaRPr lang="en-US"/>
           </a:p>
@@ -1235,7 +1323,7 @@
           <a:p>
             <a:fld id="{CAF647BD-C221-1844-9ED2-A7F7759EF665}" type="datetimeFigureOut">
               <a:rPr lang="en-US" smtClean="0"/>
-              <a:t>5/20/15</a:t>
+              <a:t>5/21/15</a:t>
             </a:fld>
             <a:endParaRPr lang="en-US"/>
           </a:p>
@@ -1410,7 +1498,7 @@
           <a:p>
             <a:fld id="{CAF647BD-C221-1844-9ED2-A7F7759EF665}" type="datetimeFigureOut">
               <a:rPr lang="en-US" smtClean="0"/>
-              <a:t>5/20/15</a:t>
+              <a:t>5/21/15</a:t>
             </a:fld>
             <a:endParaRPr lang="en-US"/>
           </a:p>
@@ -1575,7 +1663,7 @@
           <a:p>
             <a:fld id="{CAF647BD-C221-1844-9ED2-A7F7759EF665}" type="datetimeFigureOut">
               <a:rPr lang="en-US" smtClean="0"/>
-              <a:t>5/20/15</a:t>
+              <a:t>5/21/15</a:t>
             </a:fld>
             <a:endParaRPr lang="en-US"/>
           </a:p>
@@ -1824,7 +1912,7 @@
           <a:p>
             <a:fld id="{CAF647BD-C221-1844-9ED2-A7F7759EF665}" type="datetimeFigureOut">
               <a:rPr lang="en-US" smtClean="0"/>
-              <a:t>5/20/15</a:t>
+              <a:t>5/21/15</a:t>
             </a:fld>
             <a:endParaRPr lang="en-US"/>
           </a:p>
@@ -2107,7 +2195,7 @@
           <a:p>
             <a:fld id="{CAF647BD-C221-1844-9ED2-A7F7759EF665}" type="datetimeFigureOut">
               <a:rPr lang="en-US" smtClean="0"/>
-              <a:t>5/20/15</a:t>
+              <a:t>5/21/15</a:t>
             </a:fld>
             <a:endParaRPr lang="en-US"/>
           </a:p>
@@ -2546,7 +2634,7 @@
           <a:p>
             <a:fld id="{CAF647BD-C221-1844-9ED2-A7F7759EF665}" type="datetimeFigureOut">
               <a:rPr lang="en-US" smtClean="0"/>
-              <a:t>5/20/15</a:t>
+              <a:t>5/21/15</a:t>
             </a:fld>
             <a:endParaRPr lang="en-US"/>
           </a:p>
@@ -2659,7 +2747,7 @@
           <a:p>
             <a:fld id="{CAF647BD-C221-1844-9ED2-A7F7759EF665}" type="datetimeFigureOut">
               <a:rPr lang="en-US" smtClean="0"/>
-              <a:t>5/20/15</a:t>
+              <a:t>5/21/15</a:t>
             </a:fld>
             <a:endParaRPr lang="en-US"/>
           </a:p>
@@ -2749,7 +2837,7 @@
           <a:p>
             <a:fld id="{CAF647BD-C221-1844-9ED2-A7F7759EF665}" type="datetimeFigureOut">
               <a:rPr lang="en-US" smtClean="0"/>
-              <a:t>5/20/15</a:t>
+              <a:t>5/21/15</a:t>
             </a:fld>
             <a:endParaRPr lang="en-US"/>
           </a:p>
@@ -2991,7 +3079,7 @@
           <a:p>
             <a:fld id="{CAF647BD-C221-1844-9ED2-A7F7759EF665}" type="datetimeFigureOut">
               <a:rPr lang="en-US" smtClean="0"/>
-              <a:t>5/20/15</a:t>
+              <a:t>5/21/15</a:t>
             </a:fld>
             <a:endParaRPr lang="en-US"/>
           </a:p>
@@ -3285,7 +3373,7 @@
           <a:p>
             <a:fld id="{CAF647BD-C221-1844-9ED2-A7F7759EF665}" type="datetimeFigureOut">
               <a:rPr lang="en-US" smtClean="0"/>
-              <a:t>5/20/15</a:t>
+              <a:t>5/21/15</a:t>
             </a:fld>
             <a:endParaRPr lang="en-US"/>
           </a:p>
@@ -3579,7 +3667,7 @@
           <a:p>
             <a:fld id="{CAF647BD-C221-1844-9ED2-A7F7759EF665}" type="datetimeFigureOut">
               <a:rPr lang="en-US" smtClean="0"/>
-              <a:t>5/20/15</a:t>
+              <a:t>5/21/15</a:t>
             </a:fld>
             <a:endParaRPr lang="en-US"/>
           </a:p>
@@ -4368,14 +4456,7 @@
                 <a:latin typeface="Monaco"/>
                 <a:cs typeface="Monaco"/>
               </a:rPr>
-              <a:t>"</a:t>
-            </a:r>
-            <a:r>
-              <a:rPr lang="en-US" sz="2000" smtClean="0">
-                <a:latin typeface="Monaco"/>
-                <a:cs typeface="Monaco"/>
-              </a:rPr>
-              <a:t>directory/</a:t>
+              <a:t>"directory/</a:t>
             </a:r>
             <a:r>
               <a:rPr lang="en-US" sz="2000" dirty="0" smtClean="0">
@@ -7285,11 +7366,7 @@
             </a:r>
             <a:r>
               <a:rPr lang="en-US" smtClean="0"/>
-              <a:t> </a:t>
-            </a:r>
-            <a:r>
-              <a:rPr lang="en-US" smtClean="0"/>
-              <a:t>objects</a:t>
+              <a:t> objects</a:t>
             </a:r>
             <a:endParaRPr lang="en-US" dirty="0"/>
           </a:p>
@@ -7399,11 +7476,7 @@
             </a:r>
             <a:r>
               <a:rPr lang="en-US" smtClean="0"/>
-              <a:t> </a:t>
-            </a:r>
-            <a:r>
-              <a:rPr lang="en-US" smtClean="0"/>
-              <a:t>objects</a:t>
+              <a:t> objects</a:t>
             </a:r>
             <a:endParaRPr lang="en-US" dirty="0"/>
           </a:p>
@@ -7761,11 +7834,7 @@
             </a:r>
             <a:r>
               <a:rPr lang="en-US" smtClean="0"/>
-              <a:t> </a:t>
-            </a:r>
-            <a:r>
-              <a:rPr lang="en-US" smtClean="0"/>
-              <a:t>objects</a:t>
+              <a:t> objects</a:t>
             </a:r>
             <a:endParaRPr lang="en-US" dirty="0"/>
           </a:p>
@@ -8443,13 +8512,8 @@
             </a:r>
             <a:r>
               <a:rPr lang="en-US" dirty="0" smtClean="0"/>
-              <a:t> for multiple sequence alignment </a:t>
-            </a:r>
-            <a:r>
-              <a:rPr lang="en-US" dirty="0" smtClean="0"/>
-              <a:t>files</a:t>
-            </a:r>
-            <a:endParaRPr lang="en-US" dirty="0" smtClean="0"/>
+              <a:t> for multiple sequence alignment files</a:t>
+            </a:r>
           </a:p>
           <a:p>
             <a:pPr lvl="1" indent="0">
@@ -10405,7 +10469,7 @@
             </a:pPr>
             <a:r>
               <a:rPr lang="en-US" dirty="0" smtClean="0"/>
-              <a:t>Easily convert between sequence file formats </a:t>
+              <a:t>Easily convert between sequence file formats with </a:t>
             </a:r>
             <a:r>
               <a:rPr lang="en-US" dirty="0" smtClean="0">
@@ -10415,243 +10479,6 @@
               <a:t>.convert()</a:t>
             </a:r>
             <a:endParaRPr lang="en-US" dirty="0">
-              <a:latin typeface="Monaco"/>
-              <a:cs typeface="Monaco"/>
-            </a:endParaRPr>
-          </a:p>
-        </p:txBody>
-      </p:sp>
-      <p:sp>
-        <p:nvSpPr>
-          <p:cNvPr id="4" name="TextBox 3"/>
-          <p:cNvSpPr txBox="1"/>
-          <p:nvPr/>
-        </p:nvSpPr>
-        <p:spPr>
-          <a:xfrm>
-            <a:off x="195492" y="3103306"/>
-            <a:ext cx="8948508" cy="3170099"/>
-          </a:xfrm>
-          <a:prstGeom prst="rect">
-            <a:avLst/>
-          </a:prstGeom>
-          <a:noFill/>
-        </p:spPr>
-        <p:txBody>
-          <a:bodyPr wrap="square" rtlCol="0">
-            <a:spAutoFit/>
-          </a:bodyPr>
-          <a:lstStyle/>
-          <a:p>
-            <a:r>
-              <a:rPr lang="en-US" sz="2000" dirty="0" smtClean="0">
-                <a:latin typeface="Monaco"/>
-                <a:cs typeface="Monaco"/>
-              </a:rPr>
-              <a:t>from Bio import </a:t>
-            </a:r>
-            <a:r>
-              <a:rPr lang="en-US" sz="2000" dirty="0" err="1" smtClean="0">
-                <a:latin typeface="Monaco"/>
-                <a:cs typeface="Monaco"/>
-              </a:rPr>
-              <a:t>AlignIO</a:t>
-            </a:r>
-            <a:endParaRPr lang="en-US" sz="2000" dirty="0" smtClean="0">
-              <a:latin typeface="Monaco"/>
-              <a:cs typeface="Monaco"/>
-            </a:endParaRPr>
-          </a:p>
-          <a:p>
-            <a:endParaRPr lang="en-US" sz="2000" dirty="0">
-              <a:latin typeface="Monaco"/>
-              <a:cs typeface="Monaco"/>
-            </a:endParaRPr>
-          </a:p>
-          <a:p>
-            <a:r>
-              <a:rPr lang="en-US" sz="2000" dirty="0" smtClean="0">
-                <a:latin typeface="Monaco"/>
-                <a:cs typeface="Monaco"/>
-              </a:rPr>
-              <a:t># Input file is FASTA, but we want PHYLIP!</a:t>
-            </a:r>
-          </a:p>
-          <a:p>
-            <a:r>
-              <a:rPr lang="en-US" sz="2000" dirty="0" smtClean="0">
-                <a:latin typeface="Monaco"/>
-                <a:cs typeface="Monaco"/>
-              </a:rPr>
-              <a:t>#</a:t>
-            </a:r>
-            <a:r>
-              <a:rPr lang="en-US" sz="2000" dirty="0" err="1" smtClean="0">
-                <a:latin typeface="Monaco"/>
-                <a:cs typeface="Monaco"/>
-              </a:rPr>
-              <a:t>AlignIO.convert</a:t>
-            </a:r>
-            <a:r>
-              <a:rPr lang="en-US" sz="2000" dirty="0" smtClean="0">
-                <a:latin typeface="Monaco"/>
-                <a:cs typeface="Monaco"/>
-              </a:rPr>
-              <a:t>(&lt;</a:t>
-            </a:r>
-            <a:r>
-              <a:rPr lang="en-US" sz="2000" dirty="0" err="1" smtClean="0">
-                <a:latin typeface="Monaco"/>
-                <a:cs typeface="Monaco"/>
-              </a:rPr>
-              <a:t>infile</a:t>
-            </a:r>
-            <a:r>
-              <a:rPr lang="en-US" sz="2000" dirty="0" smtClean="0">
-                <a:latin typeface="Monaco"/>
-                <a:cs typeface="Monaco"/>
-              </a:rPr>
-              <a:t>&gt;, &lt;</a:t>
-            </a:r>
-            <a:r>
-              <a:rPr lang="en-US" sz="2000" dirty="0" err="1" smtClean="0">
-                <a:latin typeface="Monaco"/>
-                <a:cs typeface="Monaco"/>
-              </a:rPr>
-              <a:t>informat</a:t>
-            </a:r>
-            <a:r>
-              <a:rPr lang="en-US" sz="2000" dirty="0" smtClean="0">
-                <a:latin typeface="Monaco"/>
-                <a:cs typeface="Monaco"/>
-              </a:rPr>
-              <a:t>&gt;, &lt;</a:t>
-            </a:r>
-            <a:r>
-              <a:rPr lang="en-US" sz="2000" dirty="0" err="1" smtClean="0">
-                <a:latin typeface="Monaco"/>
-                <a:cs typeface="Monaco"/>
-              </a:rPr>
-              <a:t>outfile</a:t>
-            </a:r>
-            <a:r>
-              <a:rPr lang="en-US" sz="2000" dirty="0" smtClean="0">
-                <a:latin typeface="Monaco"/>
-                <a:cs typeface="Monaco"/>
-              </a:rPr>
-              <a:t>&gt;, </a:t>
-            </a:r>
-            <a:r>
-              <a:rPr lang="en-US" sz="2000" dirty="0" err="1" smtClean="0">
-                <a:latin typeface="Monaco"/>
-                <a:cs typeface="Monaco"/>
-              </a:rPr>
-              <a:t>outformat</a:t>
-            </a:r>
-            <a:r>
-              <a:rPr lang="en-US" sz="2000" dirty="0" smtClean="0">
-                <a:latin typeface="Monaco"/>
-                <a:cs typeface="Monaco"/>
-              </a:rPr>
-              <a:t>&gt;)</a:t>
-            </a:r>
-          </a:p>
-          <a:p>
-            <a:endParaRPr lang="en-US" sz="2000" dirty="0">
-              <a:latin typeface="Monaco"/>
-              <a:cs typeface="Monaco"/>
-            </a:endParaRPr>
-          </a:p>
-          <a:p>
-            <a:r>
-              <a:rPr lang="en-US" sz="2000" dirty="0" err="1" smtClean="0">
-                <a:latin typeface="Monaco"/>
-                <a:cs typeface="Monaco"/>
-              </a:rPr>
-              <a:t>AlignIO.convert</a:t>
-            </a:r>
-            <a:r>
-              <a:rPr lang="en-US" sz="2000" dirty="0" smtClean="0">
-                <a:latin typeface="Monaco"/>
-                <a:cs typeface="Monaco"/>
-              </a:rPr>
-              <a:t>("</a:t>
-            </a:r>
-            <a:r>
-              <a:rPr lang="en-US" sz="2000" dirty="0" err="1" smtClean="0">
-                <a:latin typeface="Monaco"/>
-                <a:cs typeface="Monaco"/>
-              </a:rPr>
-              <a:t>in.fasta</a:t>
-            </a:r>
-            <a:r>
-              <a:rPr lang="en-US" sz="2000" dirty="0" smtClean="0">
-                <a:latin typeface="Monaco"/>
-                <a:cs typeface="Monaco"/>
-              </a:rPr>
-              <a:t>", "</a:t>
-            </a:r>
-            <a:r>
-              <a:rPr lang="en-US" sz="2000" dirty="0" err="1" smtClean="0">
-                <a:latin typeface="Monaco"/>
-                <a:cs typeface="Monaco"/>
-              </a:rPr>
-              <a:t>fasta</a:t>
-            </a:r>
-            <a:r>
-              <a:rPr lang="en-US" sz="2000" dirty="0" smtClean="0">
-                <a:latin typeface="Monaco"/>
-                <a:cs typeface="Monaco"/>
-              </a:rPr>
-              <a:t>", "</a:t>
-            </a:r>
-            <a:r>
-              <a:rPr lang="en-US" sz="2000" dirty="0" err="1" smtClean="0">
-                <a:latin typeface="Monaco"/>
-                <a:cs typeface="Monaco"/>
-              </a:rPr>
-              <a:t>out.phy</a:t>
-            </a:r>
-            <a:r>
-              <a:rPr lang="en-US" sz="2000" dirty="0" smtClean="0">
-                <a:latin typeface="Monaco"/>
-                <a:cs typeface="Monaco"/>
-              </a:rPr>
-              <a:t>", "</a:t>
-            </a:r>
-            <a:r>
-              <a:rPr lang="en-US" sz="2000" dirty="0" err="1" smtClean="0">
-                <a:latin typeface="Monaco"/>
-                <a:cs typeface="Monaco"/>
-              </a:rPr>
-              <a:t>phylip</a:t>
-            </a:r>
-            <a:r>
-              <a:rPr lang="en-US" sz="2000" dirty="0" smtClean="0">
-                <a:latin typeface="Monaco"/>
-                <a:cs typeface="Monaco"/>
-              </a:rPr>
-              <a:t>")</a:t>
-            </a:r>
-            <a:endParaRPr lang="en-US" sz="2000" dirty="0">
-              <a:latin typeface="Monaco"/>
-              <a:cs typeface="Monaco"/>
-            </a:endParaRPr>
-          </a:p>
-          <a:p>
-            <a:endParaRPr lang="en-US" sz="2000" dirty="0" smtClean="0">
-              <a:latin typeface="Monaco"/>
-              <a:cs typeface="Monaco"/>
-            </a:endParaRPr>
-          </a:p>
-          <a:p>
-            <a:endParaRPr lang="en-US" sz="2000" dirty="0">
-              <a:latin typeface="Monaco"/>
-              <a:cs typeface="Monaco"/>
-            </a:endParaRPr>
-          </a:p>
-          <a:p>
-            <a:endParaRPr lang="en-US" sz="2000" dirty="0" smtClean="0">
               <a:latin typeface="Monaco"/>
               <a:cs typeface="Monaco"/>
             </a:endParaRPr>
@@ -10705,7 +10532,7 @@
           <a:p>
             <a:r>
               <a:rPr lang="en-US" dirty="0" smtClean="0"/>
-              <a:t>Writing sequence data</a:t>
+              <a:t>converting sequence data format</a:t>
             </a:r>
             <a:endParaRPr lang="en-US" dirty="0"/>
           </a:p>
@@ -10732,85 +10559,15 @@
             </a:pPr>
             <a:r>
               <a:rPr lang="en-US" dirty="0" smtClean="0"/>
-              <a:t>Use the </a:t>
+              <a:t>Easily convert between sequence file formats with </a:t>
             </a:r>
             <a:r>
               <a:rPr lang="en-US" dirty="0" smtClean="0">
                 <a:latin typeface="Monaco"/>
                 <a:cs typeface="Monaco"/>
               </a:rPr>
-              <a:t>.write() </a:t>
-            </a:r>
-            <a:r>
-              <a:rPr lang="en-US" dirty="0" smtClean="0"/>
-              <a:t>method to write  </a:t>
-            </a:r>
-            <a:r>
-              <a:rPr lang="en-US" dirty="0" err="1" smtClean="0">
-                <a:latin typeface="Monaco"/>
-                <a:cs typeface="Monaco"/>
-              </a:rPr>
-              <a:t>SeqRecord</a:t>
-            </a:r>
-            <a:r>
-              <a:rPr lang="en-US" dirty="0" smtClean="0"/>
-              <a:t> object(s) to </a:t>
-            </a:r>
-            <a:r>
-              <a:rPr lang="en-US" smtClean="0"/>
-              <a:t>a </a:t>
-            </a:r>
-            <a:r>
-              <a:rPr lang="en-US" smtClean="0"/>
-              <a:t>file</a:t>
-            </a:r>
-          </a:p>
-          <a:p>
-            <a:pPr marL="457200" indent="-457200">
-              <a:buFont typeface="Arial"/>
-              <a:buChar char="•"/>
-            </a:pPr>
-            <a:endParaRPr lang="en-US"/>
-          </a:p>
-          <a:p>
-            <a:pPr marL="457200" indent="-457200">
-              <a:buFont typeface="Arial"/>
-              <a:buChar char="•"/>
-            </a:pPr>
-            <a:endParaRPr lang="en-US" smtClean="0"/>
-          </a:p>
-          <a:p>
-            <a:pPr marL="457200" indent="-457200">
-              <a:buFont typeface="Arial"/>
-              <a:buChar char="•"/>
-            </a:pPr>
-            <a:endParaRPr lang="en-US"/>
-          </a:p>
-          <a:p>
-            <a:pPr marL="457200" indent="-457200">
-              <a:buFont typeface="Arial"/>
-              <a:buChar char="•"/>
-            </a:pPr>
-            <a:endParaRPr lang="en-US" smtClean="0"/>
-          </a:p>
-          <a:p>
-            <a:pPr marL="457200" indent="-457200">
-              <a:buFont typeface="Arial"/>
-              <a:buChar char="•"/>
-            </a:pPr>
-            <a:endParaRPr lang="en-US"/>
-          </a:p>
-          <a:p>
-            <a:endParaRPr lang="en-US" dirty="0" smtClean="0"/>
-          </a:p>
-          <a:p>
-            <a:endParaRPr lang="en-US" dirty="0" smtClean="0"/>
-          </a:p>
-          <a:p>
-            <a:pPr marL="914400" lvl="1" indent="-457200">
-              <a:buFont typeface="Arial"/>
-              <a:buChar char="•"/>
-            </a:pPr>
+              <a:t>.convert()</a:t>
+            </a:r>
             <a:endParaRPr lang="en-US" dirty="0">
               <a:latin typeface="Monaco"/>
               <a:cs typeface="Monaco"/>
@@ -10820,14 +10577,14 @@
       </p:sp>
       <p:sp>
         <p:nvSpPr>
-          <p:cNvPr id="5" name="TextBox 4"/>
+          <p:cNvPr id="4" name="TextBox 3"/>
           <p:cNvSpPr txBox="1"/>
           <p:nvPr/>
         </p:nvSpPr>
         <p:spPr>
           <a:xfrm>
-            <a:off x="1904939" y="858352"/>
-            <a:ext cx="184666" cy="369332"/>
+            <a:off x="195492" y="3103306"/>
+            <a:ext cx="8948508" cy="3170099"/>
           </a:xfrm>
           <a:prstGeom prst="rect">
             <a:avLst/>
@@ -10835,19 +10592,230 @@
           <a:noFill/>
         </p:spPr>
         <p:txBody>
-          <a:bodyPr wrap="none" rtlCol="0">
+          <a:bodyPr wrap="square" rtlCol="0">
             <a:spAutoFit/>
           </a:bodyPr>
           <a:lstStyle/>
           <a:p>
-            <a:endParaRPr lang="en-US" dirty="0"/>
+            <a:r>
+              <a:rPr lang="en-US" sz="2000" dirty="0" smtClean="0">
+                <a:latin typeface="Monaco"/>
+                <a:cs typeface="Monaco"/>
+              </a:rPr>
+              <a:t>from Bio import </a:t>
+            </a:r>
+            <a:r>
+              <a:rPr lang="en-US" sz="2000" dirty="0" err="1" smtClean="0">
+                <a:latin typeface="Monaco"/>
+                <a:cs typeface="Monaco"/>
+              </a:rPr>
+              <a:t>AlignIO</a:t>
+            </a:r>
+            <a:endParaRPr lang="en-US" sz="2000" dirty="0" smtClean="0">
+              <a:latin typeface="Monaco"/>
+              <a:cs typeface="Monaco"/>
+            </a:endParaRPr>
+          </a:p>
+          <a:p>
+            <a:endParaRPr lang="en-US" sz="2000" dirty="0">
+              <a:latin typeface="Monaco"/>
+              <a:cs typeface="Monaco"/>
+            </a:endParaRPr>
+          </a:p>
+          <a:p>
+            <a:r>
+              <a:rPr lang="en-US" sz="2000" dirty="0" smtClean="0">
+                <a:latin typeface="Monaco"/>
+                <a:cs typeface="Monaco"/>
+              </a:rPr>
+              <a:t># Input file is FASTA, but we want PHYLIP!</a:t>
+            </a:r>
+          </a:p>
+          <a:p>
+            <a:r>
+              <a:rPr lang="en-US" sz="2000" dirty="0" smtClean="0">
+                <a:latin typeface="Monaco"/>
+                <a:cs typeface="Monaco"/>
+              </a:rPr>
+              <a:t>#</a:t>
+            </a:r>
+            <a:r>
+              <a:rPr lang="en-US" sz="2000" dirty="0" err="1" smtClean="0">
+                <a:latin typeface="Monaco"/>
+                <a:cs typeface="Monaco"/>
+              </a:rPr>
+              <a:t>AlignIO.convert</a:t>
+            </a:r>
+            <a:r>
+              <a:rPr lang="en-US" sz="2000" dirty="0" smtClean="0">
+                <a:latin typeface="Monaco"/>
+                <a:cs typeface="Monaco"/>
+              </a:rPr>
+              <a:t>(&lt;</a:t>
+            </a:r>
+            <a:r>
+              <a:rPr lang="en-US" sz="2000" dirty="0" err="1" smtClean="0">
+                <a:latin typeface="Monaco"/>
+                <a:cs typeface="Monaco"/>
+              </a:rPr>
+              <a:t>infile</a:t>
+            </a:r>
+            <a:r>
+              <a:rPr lang="en-US" sz="2000" dirty="0" smtClean="0">
+                <a:latin typeface="Monaco"/>
+                <a:cs typeface="Monaco"/>
+              </a:rPr>
+              <a:t>&gt;, &lt;</a:t>
+            </a:r>
+            <a:r>
+              <a:rPr lang="en-US" sz="2000" dirty="0" err="1" smtClean="0">
+                <a:latin typeface="Monaco"/>
+                <a:cs typeface="Monaco"/>
+              </a:rPr>
+              <a:t>informat</a:t>
+            </a:r>
+            <a:r>
+              <a:rPr lang="en-US" sz="2000" dirty="0" smtClean="0">
+                <a:latin typeface="Monaco"/>
+                <a:cs typeface="Monaco"/>
+              </a:rPr>
+              <a:t>&gt;, &lt;</a:t>
+            </a:r>
+            <a:r>
+              <a:rPr lang="en-US" sz="2000" dirty="0" err="1" smtClean="0">
+                <a:latin typeface="Monaco"/>
+                <a:cs typeface="Monaco"/>
+              </a:rPr>
+              <a:t>outfile</a:t>
+            </a:r>
+            <a:r>
+              <a:rPr lang="en-US" sz="2000" dirty="0" smtClean="0">
+                <a:latin typeface="Monaco"/>
+                <a:cs typeface="Monaco"/>
+              </a:rPr>
+              <a:t>&gt;, </a:t>
+            </a:r>
+            <a:r>
+              <a:rPr lang="en-US" sz="2000" dirty="0" err="1" smtClean="0">
+                <a:latin typeface="Monaco"/>
+                <a:cs typeface="Monaco"/>
+              </a:rPr>
+              <a:t>outformat</a:t>
+            </a:r>
+            <a:r>
+              <a:rPr lang="en-US" sz="2000" dirty="0" smtClean="0">
+                <a:latin typeface="Monaco"/>
+                <a:cs typeface="Monaco"/>
+              </a:rPr>
+              <a:t>&gt;)</a:t>
+            </a:r>
+          </a:p>
+          <a:p>
+            <a:endParaRPr lang="en-US" sz="2000" dirty="0">
+              <a:latin typeface="Monaco"/>
+              <a:cs typeface="Monaco"/>
+            </a:endParaRPr>
+          </a:p>
+          <a:p>
+            <a:r>
+              <a:rPr lang="en-US" sz="2000" dirty="0" err="1" smtClean="0">
+                <a:latin typeface="Monaco"/>
+                <a:cs typeface="Monaco"/>
+              </a:rPr>
+              <a:t>AlignIO.convert</a:t>
+            </a:r>
+            <a:r>
+              <a:rPr lang="en-US" sz="2000" dirty="0" smtClean="0">
+                <a:latin typeface="Monaco"/>
+                <a:cs typeface="Monaco"/>
+              </a:rPr>
+              <a:t>("</a:t>
+            </a:r>
+            <a:r>
+              <a:rPr lang="en-US" sz="2000" dirty="0" err="1" smtClean="0">
+                <a:latin typeface="Monaco"/>
+                <a:cs typeface="Monaco"/>
+              </a:rPr>
+              <a:t>in.fasta</a:t>
+            </a:r>
+            <a:r>
+              <a:rPr lang="en-US" sz="2000" dirty="0" smtClean="0">
+                <a:latin typeface="Monaco"/>
+                <a:cs typeface="Monaco"/>
+              </a:rPr>
+              <a:t>", "</a:t>
+            </a:r>
+            <a:r>
+              <a:rPr lang="en-US" sz="2000" dirty="0" err="1" smtClean="0">
+                <a:latin typeface="Monaco"/>
+                <a:cs typeface="Monaco"/>
+              </a:rPr>
+              <a:t>fasta</a:t>
+            </a:r>
+            <a:r>
+              <a:rPr lang="en-US" sz="2000" dirty="0" smtClean="0">
+                <a:latin typeface="Monaco"/>
+                <a:cs typeface="Monaco"/>
+              </a:rPr>
+              <a:t>", "</a:t>
+            </a:r>
+            <a:r>
+              <a:rPr lang="en-US" sz="2000" dirty="0" err="1" smtClean="0">
+                <a:latin typeface="Monaco"/>
+                <a:cs typeface="Monaco"/>
+              </a:rPr>
+              <a:t>out.phy</a:t>
+            </a:r>
+            <a:r>
+              <a:rPr lang="en-US" sz="2000" dirty="0" smtClean="0">
+                <a:latin typeface="Monaco"/>
+                <a:cs typeface="Monaco"/>
+              </a:rPr>
+              <a:t>", "</a:t>
+            </a:r>
+            <a:r>
+              <a:rPr lang="en-US" sz="2000" dirty="0" err="1" smtClean="0">
+                <a:latin typeface="Monaco"/>
+                <a:cs typeface="Monaco"/>
+              </a:rPr>
+              <a:t>phylip</a:t>
+            </a:r>
+            <a:r>
+              <a:rPr lang="en-US" sz="2000" dirty="0" smtClean="0">
+                <a:latin typeface="Monaco"/>
+                <a:cs typeface="Monaco"/>
+              </a:rPr>
+              <a:t>")</a:t>
+            </a:r>
+            <a:endParaRPr lang="en-US" sz="2000" dirty="0">
+              <a:latin typeface="Monaco"/>
+              <a:cs typeface="Monaco"/>
+            </a:endParaRPr>
+          </a:p>
+          <a:p>
+            <a:endParaRPr lang="en-US" sz="2000" dirty="0" smtClean="0">
+              <a:latin typeface="Monaco"/>
+              <a:cs typeface="Monaco"/>
+            </a:endParaRPr>
+          </a:p>
+          <a:p>
+            <a:endParaRPr lang="en-US" sz="2000" dirty="0">
+              <a:latin typeface="Monaco"/>
+              <a:cs typeface="Monaco"/>
+            </a:endParaRPr>
+          </a:p>
+          <a:p>
+            <a:endParaRPr lang="en-US" sz="2000" dirty="0" smtClean="0">
+              <a:latin typeface="Monaco"/>
+              <a:cs typeface="Monaco"/>
+            </a:endParaRPr>
           </a:p>
         </p:txBody>
       </p:sp>
     </p:spTree>
     <p:extLst>
       <p:ext uri="{BB962C8B-B14F-4D97-AF65-F5344CB8AC3E}">
-        <p14:creationId xmlns:p14="http://schemas.microsoft.com/office/powerpoint/2010/main" val="1888000921"/>
+        <p14:creationId xmlns:p14="http://schemas.microsoft.com/office/powerpoint/2010/main" val="641959938"/>
       </p:ext>
     </p:extLst>
   </p:cSld>
@@ -10909,9 +10877,7 @@
         </p:nvSpPr>
         <p:spPr/>
         <p:txBody>
-          <a:bodyPr>
-            <a:normAutofit/>
-          </a:bodyPr>
+          <a:bodyPr/>
           <a:lstStyle/>
           <a:p>
             <a:pPr marL="457200" indent="-457200">
@@ -10946,21 +10912,59 @@
             </a:r>
             <a:r>
               <a:rPr lang="en-US" smtClean="0"/>
-              <a:t>a </a:t>
-            </a:r>
-            <a:r>
-              <a:rPr lang="en-US" smtClean="0"/>
-              <a:t>file</a:t>
-            </a:r>
-          </a:p>
-          <a:p>
+              <a:t>a file</a:t>
+            </a:r>
+          </a:p>
+          <a:p>
+            <a:pPr marL="457200" indent="-457200">
+              <a:buFont typeface="Arial"/>
+              <a:buChar char="•"/>
+            </a:pPr>
+            <a:endParaRPr lang="en-US"/>
+          </a:p>
+          <a:p>
+            <a:pPr marL="457200" indent="-457200">
+              <a:buFont typeface="Arial"/>
+              <a:buChar char="•"/>
+            </a:pPr>
+            <a:endParaRPr lang="en-US" smtClean="0"/>
+          </a:p>
+          <a:p>
+            <a:pPr marL="457200" indent="-457200">
+              <a:buFont typeface="Arial"/>
+              <a:buChar char="•"/>
+            </a:pPr>
+            <a:endParaRPr lang="en-US"/>
+          </a:p>
+          <a:p>
+            <a:pPr marL="457200" indent="-457200">
+              <a:buFont typeface="Arial"/>
+              <a:buChar char="•"/>
+            </a:pPr>
+            <a:endParaRPr lang="en-US" smtClean="0"/>
+          </a:p>
+          <a:p>
+            <a:pPr marL="457200" indent="-457200">
+              <a:buFont typeface="Arial"/>
+              <a:buChar char="•"/>
+            </a:pPr>
+            <a:endParaRPr lang="en-US"/>
+          </a:p>
+          <a:p>
+            <a:endParaRPr lang="en-US" dirty="0" smtClean="0"/>
+          </a:p>
+          <a:p>
+            <a:endParaRPr lang="en-US" dirty="0" smtClean="0"/>
+          </a:p>
+          <a:p>
+            <a:pPr marL="914400" lvl="1" indent="-457200">
+              <a:buFont typeface="Arial"/>
+              <a:buChar char="•"/>
+            </a:pPr>
             <a:endParaRPr lang="en-US" dirty="0">
               <a:latin typeface="Monaco"/>
               <a:cs typeface="Monaco"/>
             </a:endParaRPr>
-          </a:p>
-          <a:p>
-            <a:endParaRPr lang="en-US" dirty="0" smtClean="0"/>
           </a:p>
         </p:txBody>
       </p:sp>
@@ -10990,121 +10994,10 @@
           </a:p>
         </p:txBody>
       </p:sp>
-      <p:sp>
-        <p:nvSpPr>
-          <p:cNvPr id="6" name="TextBox 5"/>
-          <p:cNvSpPr txBox="1"/>
-          <p:nvPr/>
-        </p:nvSpPr>
-        <p:spPr>
-          <a:xfrm>
-            <a:off x="977894" y="3103306"/>
-            <a:ext cx="7658107" cy="1938992"/>
-          </a:xfrm>
-          <a:prstGeom prst="rect">
-            <a:avLst/>
-          </a:prstGeom>
-          <a:noFill/>
-        </p:spPr>
-        <p:txBody>
-          <a:bodyPr wrap="square" rtlCol="0">
-            <a:spAutoFit/>
-          </a:bodyPr>
-          <a:lstStyle/>
-          <a:p>
-            <a:r>
-              <a:rPr lang="en-US" sz="2000" dirty="0" smtClean="0">
-                <a:latin typeface="Monaco"/>
-                <a:cs typeface="Monaco"/>
-              </a:rPr>
-              <a:t>from Bio </a:t>
-            </a:r>
-            <a:r>
-              <a:rPr lang="en-US" sz="2000" smtClean="0">
-                <a:latin typeface="Monaco"/>
-                <a:cs typeface="Monaco"/>
-              </a:rPr>
-              <a:t>import </a:t>
-            </a:r>
-            <a:r>
-              <a:rPr lang="en-US" sz="2000" smtClean="0">
-                <a:latin typeface="Monaco"/>
-                <a:cs typeface="Monaco"/>
-              </a:rPr>
-              <a:t>SeqIO</a:t>
-            </a:r>
-            <a:endParaRPr lang="en-US" sz="2000" dirty="0" smtClean="0">
-              <a:latin typeface="Monaco"/>
-              <a:cs typeface="Monaco"/>
-            </a:endParaRPr>
-          </a:p>
-          <a:p>
-            <a:endParaRPr lang="en-US" sz="2000">
-              <a:latin typeface="Monaco"/>
-              <a:cs typeface="Monaco"/>
-            </a:endParaRPr>
-          </a:p>
-          <a:p>
-            <a:r>
-              <a:rPr lang="en-US" sz="2000" smtClean="0">
-                <a:latin typeface="Monaco"/>
-                <a:cs typeface="Monaco"/>
-              </a:rPr>
-              <a:t>SeqIO.write</a:t>
-            </a:r>
-            <a:r>
-              <a:rPr lang="en-US" sz="2000">
-                <a:latin typeface="Monaco"/>
-                <a:cs typeface="Monaco"/>
-              </a:rPr>
-              <a:t>(</a:t>
-            </a:r>
-            <a:r>
-              <a:rPr lang="en-US" sz="2000">
-                <a:latin typeface="Monaco"/>
-                <a:cs typeface="Monaco"/>
-              </a:rPr>
-              <a:t>&lt;</a:t>
-            </a:r>
-            <a:r>
-              <a:rPr lang="en-US" sz="2000" smtClean="0">
-                <a:latin typeface="Monaco"/>
-                <a:cs typeface="Monaco"/>
-              </a:rPr>
-              <a:t>record(s)&gt;</a:t>
-            </a:r>
-            <a:r>
-              <a:rPr lang="en-US" sz="2000">
-                <a:latin typeface="Monaco"/>
-                <a:cs typeface="Monaco"/>
-              </a:rPr>
-              <a:t>, &lt;outfile&gt;, &lt;outformat&gt;)</a:t>
-            </a:r>
-          </a:p>
-          <a:p>
-            <a:endParaRPr lang="en-US" sz="2000" dirty="0" smtClean="0">
-              <a:latin typeface="Monaco"/>
-              <a:cs typeface="Monaco"/>
-            </a:endParaRPr>
-          </a:p>
-          <a:p>
-            <a:endParaRPr lang="en-US" sz="2000" dirty="0">
-              <a:latin typeface="Monaco"/>
-              <a:cs typeface="Monaco"/>
-            </a:endParaRPr>
-          </a:p>
-          <a:p>
-            <a:endParaRPr lang="en-US" sz="2000" dirty="0" smtClean="0">
-              <a:latin typeface="Monaco"/>
-              <a:cs typeface="Monaco"/>
-            </a:endParaRPr>
-          </a:p>
-        </p:txBody>
-      </p:sp>
     </p:spTree>
     <p:extLst>
       <p:ext uri="{BB962C8B-B14F-4D97-AF65-F5344CB8AC3E}">
-        <p14:creationId xmlns:p14="http://schemas.microsoft.com/office/powerpoint/2010/main" val="2884034646"/>
+        <p14:creationId xmlns:p14="http://schemas.microsoft.com/office/powerpoint/2010/main" val="1888000921"/>
       </p:ext>
     </p:extLst>
   </p:cSld>
@@ -11203,55 +11096,8 @@
             </a:r>
             <a:r>
               <a:rPr lang="en-US" smtClean="0"/>
-              <a:t>a </a:t>
-            </a:r>
-            <a:r>
-              <a:rPr lang="en-US" smtClean="0"/>
-              <a:t>file</a:t>
-            </a:r>
-          </a:p>
-          <a:p>
-            <a:pPr marL="457200" indent="-457200">
-              <a:buFont typeface="Arial"/>
-              <a:buChar char="•"/>
-            </a:pPr>
-            <a:endParaRPr lang="en-US"/>
-          </a:p>
-          <a:p>
-            <a:pPr marL="457200" indent="-457200">
-              <a:buFont typeface="Arial"/>
-              <a:buChar char="•"/>
-            </a:pPr>
-            <a:endParaRPr lang="en-US" smtClean="0"/>
-          </a:p>
-          <a:p>
-            <a:pPr marL="457200" indent="-457200">
-              <a:buFont typeface="Arial"/>
-              <a:buChar char="•"/>
-            </a:pPr>
-            <a:endParaRPr lang="en-US"/>
-          </a:p>
-          <a:p>
-            <a:pPr marL="457200" indent="-457200">
-              <a:buFont typeface="Arial"/>
-              <a:buChar char="•"/>
-            </a:pPr>
-            <a:r>
-              <a:rPr lang="en-US" smtClean="0"/>
-              <a:t>For various reasons, just use </a:t>
-            </a:r>
-            <a:r>
-              <a:rPr lang="en-US" smtClean="0">
-                <a:latin typeface="Monaco"/>
-                <a:cs typeface="Monaco"/>
-              </a:rPr>
-              <a:t>SeqIO</a:t>
-            </a:r>
-            <a:r>
-              <a:rPr lang="en-US" smtClean="0"/>
-              <a:t> for writing</a:t>
-            </a:r>
-            <a:endParaRPr lang="en-US" dirty="0" smtClean="0"/>
+              <a:t>a file</a:t>
+            </a:r>
           </a:p>
           <a:p>
             <a:endParaRPr lang="en-US" dirty="0">
@@ -11299,7 +11145,7 @@
         <p:spPr>
           <a:xfrm>
             <a:off x="977894" y="3103306"/>
-            <a:ext cx="7658107" cy="1631216"/>
+            <a:ext cx="7658107" cy="1938992"/>
           </a:xfrm>
           <a:prstGeom prst="rect">
             <a:avLst/>
@@ -11324,14 +11170,7 @@
                 <a:latin typeface="Monaco"/>
                 <a:cs typeface="Monaco"/>
               </a:rPr>
-              <a:t>import </a:t>
-            </a:r>
-            <a:r>
-              <a:rPr lang="en-US" sz="2000" smtClean="0">
-                <a:latin typeface="Monaco"/>
-                <a:cs typeface="Monaco"/>
-              </a:rPr>
-              <a:t>SeqIO</a:t>
+              <a:t>import SeqIO</a:t>
             </a:r>
             <a:endParaRPr lang="en-US" sz="2000" dirty="0" smtClean="0">
               <a:latin typeface="Monaco"/>
@@ -11357,32 +11196,25 @@
                 <a:latin typeface="Monaco"/>
                 <a:cs typeface="Monaco"/>
               </a:rPr>
-              <a:t>(</a:t>
+              <a:t>(&lt;</a:t>
+            </a:r>
+            <a:r>
+              <a:rPr lang="en-US" sz="2000" smtClean="0">
+                <a:latin typeface="Monaco"/>
+                <a:cs typeface="Monaco"/>
+              </a:rPr>
+              <a:t>record(s)&gt;</a:t>
             </a:r>
             <a:r>
               <a:rPr lang="en-US" sz="2000">
                 <a:latin typeface="Monaco"/>
                 <a:cs typeface="Monaco"/>
               </a:rPr>
-              <a:t>&lt;</a:t>
-            </a:r>
-            <a:r>
-              <a:rPr lang="en-US" sz="2000" smtClean="0">
-                <a:latin typeface="Monaco"/>
-                <a:cs typeface="Monaco"/>
-              </a:rPr>
-              <a:t>record(s)&gt;</a:t>
-            </a:r>
-            <a:r>
-              <a:rPr lang="en-US" sz="2000">
-                <a:latin typeface="Monaco"/>
-                <a:cs typeface="Monaco"/>
-              </a:rPr>
               <a:t>, &lt;outfile&gt;, &lt;outformat&gt;)</a:t>
             </a:r>
           </a:p>
           <a:p>
-            <a:endParaRPr lang="en-US" sz="2000" smtClean="0">
+            <a:endParaRPr lang="en-US" sz="2000" dirty="0" smtClean="0">
               <a:latin typeface="Monaco"/>
               <a:cs typeface="Monaco"/>
             </a:endParaRPr>
@@ -11393,12 +11225,18 @@
               <a:cs typeface="Monaco"/>
             </a:endParaRPr>
           </a:p>
+          <a:p>
+            <a:endParaRPr lang="en-US" sz="2000" dirty="0" smtClean="0">
+              <a:latin typeface="Monaco"/>
+              <a:cs typeface="Monaco"/>
+            </a:endParaRPr>
+          </a:p>
         </p:txBody>
       </p:sp>
     </p:spTree>
     <p:extLst>
       <p:ext uri="{BB962C8B-B14F-4D97-AF65-F5344CB8AC3E}">
-        <p14:creationId xmlns:p14="http://schemas.microsoft.com/office/powerpoint/2010/main" val="4049135381"/>
+        <p14:creationId xmlns:p14="http://schemas.microsoft.com/office/powerpoint/2010/main" val="2884034646"/>
       </p:ext>
     </p:extLst>
   </p:cSld>
@@ -11441,14 +11279,116 @@
           <a:lstStyle/>
           <a:p>
             <a:r>
+              <a:rPr lang="en-US" dirty="0" smtClean="0"/>
+              <a:t>Writing sequence data</a:t>
+            </a:r>
+            <a:endParaRPr lang="en-US" dirty="0"/>
+          </a:p>
+        </p:txBody>
+      </p:sp>
+      <p:sp>
+        <p:nvSpPr>
+          <p:cNvPr id="3" name="Content Placeholder 2"/>
+          <p:cNvSpPr>
+            <a:spLocks noGrp="1"/>
+          </p:cNvSpPr>
+          <p:nvPr>
+            <p:ph idx="1"/>
+          </p:nvPr>
+        </p:nvSpPr>
+        <p:spPr/>
+        <p:txBody>
+          <a:bodyPr>
+            <a:normAutofit/>
+          </a:bodyPr>
+          <a:lstStyle/>
+          <a:p>
+            <a:pPr marL="457200" indent="-457200">
+              <a:buFont typeface="Arial"/>
+              <a:buChar char="•"/>
+            </a:pPr>
+            <a:r>
+              <a:rPr lang="en-US" dirty="0" smtClean="0"/>
+              <a:t>Use the </a:t>
+            </a:r>
+            <a:r>
+              <a:rPr lang="en-US" dirty="0" smtClean="0">
+                <a:latin typeface="Monaco"/>
+                <a:cs typeface="Monaco"/>
+              </a:rPr>
+              <a:t>.write() </a:t>
+            </a:r>
+            <a:r>
+              <a:rPr lang="en-US" dirty="0" smtClean="0"/>
+              <a:t>method to write  </a:t>
+            </a:r>
+            <a:r>
+              <a:rPr lang="en-US" dirty="0" err="1" smtClean="0">
+                <a:latin typeface="Monaco"/>
+                <a:cs typeface="Monaco"/>
+              </a:rPr>
+              <a:t>SeqRecord</a:t>
+            </a:r>
+            <a:r>
+              <a:rPr lang="en-US" dirty="0" smtClean="0"/>
+              <a:t> object(s) to </a:t>
+            </a:r>
+            <a:r>
               <a:rPr lang="en-US" smtClean="0"/>
-              <a:t>Writing </a:t>
-            </a:r>
+              <a:t>a file</a:t>
+            </a:r>
+          </a:p>
+          <a:p>
+            <a:pPr marL="457200" indent="-457200">
+              <a:buFont typeface="Arial"/>
+              <a:buChar char="•"/>
+            </a:pPr>
+            <a:endParaRPr lang="en-US"/>
+          </a:p>
+          <a:p>
+            <a:pPr marL="457200" indent="-457200">
+              <a:buFont typeface="Arial"/>
+              <a:buChar char="•"/>
+            </a:pPr>
+            <a:endParaRPr lang="en-US" smtClean="0"/>
+          </a:p>
+          <a:p>
+            <a:pPr marL="457200" indent="-457200">
+              <a:buFont typeface="Arial"/>
+              <a:buChar char="•"/>
+            </a:pPr>
+            <a:endParaRPr lang="en-US"/>
+          </a:p>
+          <a:p>
+            <a:pPr marL="457200" indent="-457200">
+              <a:buFont typeface="Arial"/>
+              <a:buChar char="•"/>
+            </a:pPr>
             <a:r>
               <a:rPr lang="en-US" smtClean="0"/>
-              <a:t>A single sequence to a file</a:t>
-            </a:r>
-            <a:endParaRPr lang="en-US" dirty="0"/>
+              <a:t>For various reasons, just use </a:t>
+            </a:r>
+            <a:r>
+              <a:rPr lang="en-US" smtClean="0">
+                <a:latin typeface="Monaco"/>
+                <a:cs typeface="Monaco"/>
+              </a:rPr>
+              <a:t>SeqIO</a:t>
+            </a:r>
+            <a:r>
+              <a:rPr lang="en-US" smtClean="0"/>
+              <a:t> for writing</a:t>
+            </a:r>
+            <a:endParaRPr lang="en-US" dirty="0" smtClean="0"/>
+          </a:p>
+          <a:p>
+            <a:endParaRPr lang="en-US" dirty="0">
+              <a:latin typeface="Monaco"/>
+              <a:cs typeface="Monaco"/>
+            </a:endParaRPr>
+          </a:p>
+          <a:p>
+            <a:endParaRPr lang="en-US" dirty="0" smtClean="0"/>
           </a:p>
         </p:txBody>
       </p:sp>
@@ -11480,14 +11420,14 @@
       </p:sp>
       <p:sp>
         <p:nvSpPr>
-          <p:cNvPr id="7" name="TextBox 6"/>
+          <p:cNvPr id="6" name="TextBox 5"/>
           <p:cNvSpPr txBox="1"/>
           <p:nvPr/>
         </p:nvSpPr>
         <p:spPr>
           <a:xfrm>
-            <a:off x="286449" y="1889751"/>
-            <a:ext cx="8662059" cy="3170099"/>
+            <a:off x="977894" y="3103306"/>
+            <a:ext cx="7658107" cy="1631216"/>
           </a:xfrm>
           <a:prstGeom prst="rect">
             <a:avLst/>
@@ -11505,28 +11445,14 @@
                 <a:latin typeface="Monaco"/>
                 <a:cs typeface="Monaco"/>
               </a:rPr>
-              <a:t>from </a:t>
-            </a:r>
-            <a:r>
-              <a:rPr lang="en-US" sz="2000" dirty="0" err="1" smtClean="0">
-                <a:latin typeface="Monaco"/>
-                <a:cs typeface="Monaco"/>
-              </a:rPr>
-              <a:t>Bio.Seq</a:t>
-            </a:r>
-            <a:r>
-              <a:rPr lang="en-US" sz="2000" dirty="0" smtClean="0">
-                <a:latin typeface="Monaco"/>
-                <a:cs typeface="Monaco"/>
-              </a:rPr>
-              <a:t> import </a:t>
-            </a:r>
-            <a:r>
-              <a:rPr lang="en-US" sz="2000" dirty="0" err="1" smtClean="0">
-                <a:latin typeface="Monaco"/>
-                <a:cs typeface="Monaco"/>
-              </a:rPr>
-              <a:t>Seq</a:t>
+              <a:t>from Bio </a:t>
+            </a:r>
+            <a:r>
+              <a:rPr lang="en-US" sz="2000" smtClean="0">
+                <a:latin typeface="Monaco"/>
+                <a:cs typeface="Monaco"/>
+              </a:rPr>
+              <a:t>import SeqIO</a:t>
             </a:r>
             <a:endParaRPr lang="en-US" sz="2000" dirty="0" smtClean="0">
               <a:latin typeface="Monaco"/>
@@ -11534,262 +11460,59 @@
             </a:endParaRPr>
           </a:p>
           <a:p>
-            <a:r>
-              <a:rPr lang="en-US" sz="2000" dirty="0" smtClean="0">
-                <a:latin typeface="Monaco"/>
-                <a:cs typeface="Monaco"/>
-              </a:rPr>
-              <a:t>from </a:t>
-            </a:r>
-            <a:r>
-              <a:rPr lang="en-US" sz="2000" dirty="0" err="1" smtClean="0">
-                <a:latin typeface="Monaco"/>
-                <a:cs typeface="Monaco"/>
-              </a:rPr>
-              <a:t>Bio.SecRecord</a:t>
-            </a:r>
-            <a:r>
-              <a:rPr lang="en-US" sz="2000" dirty="0" smtClean="0">
-                <a:latin typeface="Monaco"/>
-                <a:cs typeface="Monaco"/>
-              </a:rPr>
-              <a:t> import </a:t>
-            </a:r>
-            <a:r>
-              <a:rPr lang="en-US" sz="2000" dirty="0" err="1" smtClean="0">
-                <a:latin typeface="Monaco"/>
-                <a:cs typeface="Monaco"/>
-              </a:rPr>
-              <a:t>SeqRecord</a:t>
-            </a:r>
+            <a:endParaRPr lang="en-US" sz="2000">
+              <a:latin typeface="Monaco"/>
+              <a:cs typeface="Monaco"/>
+            </a:endParaRPr>
+          </a:p>
+          <a:p>
+            <a:r>
+              <a:rPr lang="en-US" sz="2000" smtClean="0">
+                <a:latin typeface="Monaco"/>
+                <a:cs typeface="Monaco"/>
+              </a:rPr>
+              <a:t>SeqIO.write</a:t>
+            </a:r>
+            <a:r>
+              <a:rPr lang="en-US" sz="2000">
+                <a:latin typeface="Monaco"/>
+                <a:cs typeface="Monaco"/>
+              </a:rPr>
+              <a:t>(&lt;</a:t>
+            </a:r>
+            <a:r>
+              <a:rPr lang="en-US" sz="2000" smtClean="0">
+                <a:latin typeface="Monaco"/>
+                <a:cs typeface="Monaco"/>
+              </a:rPr>
+              <a:t>record(s)&gt;</a:t>
+            </a:r>
+            <a:r>
+              <a:rPr lang="en-US" sz="2000">
+                <a:latin typeface="Monaco"/>
+                <a:cs typeface="Monaco"/>
+              </a:rPr>
+              <a:t>, &lt;outfile&gt;, &lt;outformat&gt;)</a:t>
+            </a:r>
+          </a:p>
+          <a:p>
+            <a:endParaRPr lang="en-US" sz="2000" smtClean="0">
+              <a:latin typeface="Monaco"/>
+              <a:cs typeface="Monaco"/>
+            </a:endParaRPr>
+          </a:p>
+          <a:p>
             <a:endParaRPr lang="en-US" sz="2000" dirty="0">
               <a:latin typeface="Monaco"/>
               <a:cs typeface="Monaco"/>
             </a:endParaRPr>
           </a:p>
-          <a:p>
-            <a:r>
-              <a:rPr lang="en-US" sz="2000" dirty="0" smtClean="0">
-                <a:latin typeface="Monaco"/>
-                <a:cs typeface="Monaco"/>
-              </a:rPr>
-              <a:t>from Bio import </a:t>
-            </a:r>
-            <a:r>
-              <a:rPr lang="en-US" sz="2000" dirty="0" err="1" smtClean="0">
-                <a:latin typeface="Monaco"/>
-                <a:cs typeface="Monaco"/>
-              </a:rPr>
-              <a:t>SeqIO</a:t>
-            </a:r>
-            <a:endParaRPr lang="en-US" sz="2000" dirty="0" smtClean="0">
-              <a:latin typeface="Monaco"/>
-              <a:cs typeface="Monaco"/>
-            </a:endParaRPr>
-          </a:p>
-          <a:p>
-            <a:endParaRPr lang="en-US" sz="2000" dirty="0">
-              <a:latin typeface="Monaco"/>
-              <a:cs typeface="Monaco"/>
-            </a:endParaRPr>
-          </a:p>
-          <a:p>
-            <a:r>
-              <a:rPr lang="en-US" sz="2000" dirty="0" smtClean="0">
-                <a:latin typeface="Monaco"/>
-                <a:cs typeface="Monaco"/>
-              </a:rPr>
-              <a:t># Define a </a:t>
-            </a:r>
-            <a:r>
-              <a:rPr lang="en-US" sz="2000" dirty="0" err="1" smtClean="0">
-                <a:latin typeface="Monaco"/>
-                <a:cs typeface="Monaco"/>
-              </a:rPr>
-              <a:t>SeqRecord</a:t>
-            </a:r>
-            <a:r>
-              <a:rPr lang="en-US" sz="2000" dirty="0" smtClean="0">
-                <a:latin typeface="Monaco"/>
-                <a:cs typeface="Monaco"/>
-              </a:rPr>
-              <a:t> object</a:t>
-            </a:r>
-          </a:p>
-          <a:p>
-            <a:r>
-              <a:rPr lang="en-US" sz="2000" dirty="0" err="1" smtClean="0">
-                <a:latin typeface="Monaco"/>
-                <a:cs typeface="Monaco"/>
-              </a:rPr>
-              <a:t>seq_object</a:t>
-            </a:r>
-            <a:r>
-              <a:rPr lang="en-US" sz="2000" dirty="0" smtClean="0">
-                <a:latin typeface="Monaco"/>
-                <a:cs typeface="Monaco"/>
-              </a:rPr>
-              <a:t> = </a:t>
-            </a:r>
-            <a:r>
-              <a:rPr lang="en-US" sz="2000" dirty="0" err="1" smtClean="0">
-                <a:latin typeface="Monaco"/>
-                <a:cs typeface="Monaco"/>
-              </a:rPr>
-              <a:t>Seq</a:t>
-            </a:r>
-            <a:r>
-              <a:rPr lang="en-US" sz="2000" dirty="0" smtClean="0">
-                <a:latin typeface="Monaco"/>
-                <a:cs typeface="Monaco"/>
-              </a:rPr>
-              <a:t>("ACGTC")</a:t>
-            </a:r>
-          </a:p>
-          <a:p>
-            <a:r>
-              <a:rPr lang="en-US" sz="2000" dirty="0" err="1" smtClean="0">
-                <a:latin typeface="Monaco"/>
-                <a:cs typeface="Monaco"/>
-              </a:rPr>
-              <a:t>seq_record</a:t>
-            </a:r>
-            <a:r>
-              <a:rPr lang="en-US" sz="2000" dirty="0" smtClean="0">
-                <a:latin typeface="Monaco"/>
-                <a:cs typeface="Monaco"/>
-              </a:rPr>
-              <a:t> = </a:t>
-            </a:r>
-            <a:r>
-              <a:rPr lang="en-US" sz="2000" dirty="0" err="1" smtClean="0">
-                <a:latin typeface="Monaco"/>
-                <a:cs typeface="Monaco"/>
-              </a:rPr>
-              <a:t>SeqRecord</a:t>
-            </a:r>
-            <a:r>
-              <a:rPr lang="en-US" sz="2000" dirty="0" smtClean="0">
-                <a:latin typeface="Monaco"/>
-                <a:cs typeface="Monaco"/>
-              </a:rPr>
-              <a:t>(</a:t>
-            </a:r>
-            <a:r>
-              <a:rPr lang="en-US" sz="2000" dirty="0" err="1" smtClean="0">
-                <a:latin typeface="Monaco"/>
-                <a:cs typeface="Monaco"/>
-              </a:rPr>
-              <a:t>seq_object</a:t>
-            </a:r>
-            <a:r>
-              <a:rPr lang="en-US" sz="2000" dirty="0" smtClean="0">
-                <a:latin typeface="Monaco"/>
-                <a:cs typeface="Monaco"/>
-              </a:rPr>
-              <a:t>, id = "</a:t>
-            </a:r>
-            <a:r>
-              <a:rPr lang="en-US" sz="2000" dirty="0" err="1" smtClean="0">
-                <a:latin typeface="Monaco"/>
-                <a:cs typeface="Monaco"/>
-              </a:rPr>
-              <a:t>my_id</a:t>
-            </a:r>
-            <a:r>
-              <a:rPr lang="en-US" sz="2000" dirty="0" smtClean="0">
-                <a:latin typeface="Monaco"/>
-                <a:cs typeface="Monaco"/>
-              </a:rPr>
-              <a:t>")</a:t>
-            </a:r>
-          </a:p>
-          <a:p>
-            <a:endParaRPr lang="en-US" sz="2000" dirty="0" smtClean="0">
-              <a:latin typeface="Monaco"/>
-              <a:cs typeface="Monaco"/>
-            </a:endParaRPr>
-          </a:p>
-          <a:p>
-            <a:r>
-              <a:rPr lang="en-US" sz="2000" dirty="0" smtClean="0">
-                <a:latin typeface="Monaco"/>
-                <a:cs typeface="Monaco"/>
-              </a:rPr>
-              <a:t># Write it to a file</a:t>
-            </a:r>
-          </a:p>
-          <a:p>
-            <a:r>
-              <a:rPr lang="en-US" sz="2000" smtClean="0">
-                <a:latin typeface="Monaco"/>
-                <a:cs typeface="Monaco"/>
-              </a:rPr>
-              <a:t>SeqIO.write</a:t>
-            </a:r>
-            <a:r>
-              <a:rPr lang="en-US" sz="2000" dirty="0" smtClean="0">
-                <a:latin typeface="Monaco"/>
-                <a:cs typeface="Monaco"/>
-              </a:rPr>
-              <a:t>(</a:t>
-            </a:r>
-            <a:r>
-              <a:rPr lang="en-US" sz="2000" dirty="0" err="1" smtClean="0">
-                <a:latin typeface="Monaco"/>
-                <a:cs typeface="Monaco"/>
-              </a:rPr>
-              <a:t>seq_record</a:t>
-            </a:r>
-            <a:r>
-              <a:rPr lang="en-US" sz="2000" dirty="0" smtClean="0">
-                <a:latin typeface="Monaco"/>
-                <a:cs typeface="Monaco"/>
-              </a:rPr>
-              <a:t>, </a:t>
-            </a:r>
-            <a:r>
-              <a:rPr lang="en-US" sz="2000" dirty="0">
-                <a:latin typeface="Monaco"/>
-                <a:cs typeface="Monaco"/>
-              </a:rPr>
-              <a:t>"</a:t>
-            </a:r>
-            <a:r>
-              <a:rPr lang="en-US" sz="2000" dirty="0" err="1">
-                <a:latin typeface="Monaco"/>
-                <a:cs typeface="Monaco"/>
-              </a:rPr>
-              <a:t>outfile.fasta</a:t>
-            </a:r>
-            <a:r>
-              <a:rPr lang="en-US" sz="2000" dirty="0" smtClean="0">
-                <a:latin typeface="Monaco"/>
-                <a:cs typeface="Monaco"/>
-              </a:rPr>
-              <a:t>", "</a:t>
-            </a:r>
-            <a:r>
-              <a:rPr lang="en-US" sz="2000" dirty="0" err="1" smtClean="0">
-                <a:latin typeface="Monaco"/>
-                <a:cs typeface="Monaco"/>
-              </a:rPr>
-              <a:t>fasta</a:t>
-            </a:r>
-            <a:r>
-              <a:rPr lang="en-US" sz="2000" dirty="0" smtClean="0">
-                <a:latin typeface="Monaco"/>
-                <a:cs typeface="Monaco"/>
-              </a:rPr>
-              <a:t>")</a:t>
-            </a:r>
-          </a:p>
         </p:txBody>
       </p:sp>
     </p:spTree>
     <p:extLst>
       <p:ext uri="{BB962C8B-B14F-4D97-AF65-F5344CB8AC3E}">
-        <p14:creationId xmlns:p14="http://schemas.microsoft.com/office/powerpoint/2010/main" val="726321036"/>
+        <p14:creationId xmlns:p14="http://schemas.microsoft.com/office/powerpoint/2010/main" val="4049135381"/>
       </p:ext>
     </p:extLst>
   </p:cSld>
@@ -12097,7 +11820,7 @@
           <a:p>
             <a:r>
               <a:rPr lang="en-US" smtClean="0"/>
-              <a:t>Writing multiple sequences to a file</a:t>
+              <a:t>Writing A single sequence to a file</a:t>
             </a:r>
             <a:endParaRPr lang="en-US" dirty="0"/>
           </a:p>
@@ -12131,14 +11854,14 @@
       </p:sp>
       <p:sp>
         <p:nvSpPr>
-          <p:cNvPr id="6" name="TextBox 5"/>
+          <p:cNvPr id="7" name="TextBox 6"/>
           <p:cNvSpPr txBox="1"/>
           <p:nvPr/>
         </p:nvSpPr>
         <p:spPr>
           <a:xfrm>
-            <a:off x="286449" y="1932084"/>
-            <a:ext cx="8662059" cy="3785652"/>
+            <a:off x="286449" y="1889751"/>
+            <a:ext cx="8662059" cy="3170099"/>
           </a:xfrm>
           <a:prstGeom prst="rect">
             <a:avLst/>
@@ -12246,72 +11969,91 @@
           </a:p>
           <a:p>
             <a:r>
-              <a:rPr lang="en-US" sz="2000" smtClean="0">
-                <a:latin typeface="Monaco"/>
-                <a:cs typeface="Monaco"/>
-              </a:rPr>
-              <a:t># </a:t>
-            </a:r>
-            <a:r>
-              <a:rPr lang="en-US" sz="2000" smtClean="0">
-                <a:latin typeface="Monaco"/>
-                <a:cs typeface="Monaco"/>
-              </a:rPr>
-              <a:t>Save lots of SeqRecord objects in a list!</a:t>
-            </a:r>
-          </a:p>
-          <a:p>
-            <a:r>
-              <a:rPr lang="en-US" sz="2000" smtClean="0">
-                <a:latin typeface="Monaco"/>
-                <a:cs typeface="Monaco"/>
-              </a:rPr>
-              <a:t>recs </a:t>
-            </a:r>
-            <a:r>
               <a:rPr lang="en-US" sz="2000" dirty="0" smtClean="0">
                 <a:latin typeface="Monaco"/>
                 <a:cs typeface="Monaco"/>
               </a:rPr>
-              <a:t>= []</a:t>
-            </a:r>
-          </a:p>
-          <a:p>
+              <a:t># Define a </a:t>
+            </a:r>
+            <a:r>
+              <a:rPr lang="en-US" sz="2000" dirty="0" err="1" smtClean="0">
+                <a:latin typeface="Monaco"/>
+                <a:cs typeface="Monaco"/>
+              </a:rPr>
+              <a:t>SeqRecord</a:t>
+            </a:r>
             <a:r>
               <a:rPr lang="en-US" sz="2000" dirty="0" smtClean="0">
                 <a:latin typeface="Monaco"/>
                 <a:cs typeface="Monaco"/>
               </a:rPr>
-              <a:t>for </a:t>
-            </a:r>
+              <a:t> object</a:t>
+            </a:r>
+          </a:p>
+          <a:p>
             <a:r>
               <a:rPr lang="en-US" sz="2000" dirty="0" err="1" smtClean="0">
                 <a:latin typeface="Monaco"/>
                 <a:cs typeface="Monaco"/>
               </a:rPr>
-              <a:t>i</a:t>
+              <a:t>seq_object</a:t>
             </a:r>
             <a:r>
               <a:rPr lang="en-US" sz="2000" dirty="0" smtClean="0">
                 <a:latin typeface="Monaco"/>
                 <a:cs typeface="Monaco"/>
               </a:rPr>
-              <a:t> in range(10):</a:t>
-            </a:r>
-          </a:p>
-          <a:p>
-            <a:r>
-              <a:rPr lang="en-US" sz="2000" dirty="0">
-                <a:latin typeface="Monaco"/>
-                <a:cs typeface="Monaco"/>
-              </a:rPr>
-              <a:t>	</a:t>
+              <a:t> = </a:t>
             </a:r>
             <a:r>
               <a:rPr lang="en-US" sz="2000" dirty="0" err="1" smtClean="0">
                 <a:latin typeface="Monaco"/>
                 <a:cs typeface="Monaco"/>
               </a:rPr>
+              <a:t>Seq</a:t>
+            </a:r>
+            <a:r>
+              <a:rPr lang="en-US" sz="2000" dirty="0" smtClean="0">
+                <a:latin typeface="Monaco"/>
+                <a:cs typeface="Monaco"/>
+              </a:rPr>
+              <a:t>("ACGTC")</a:t>
+            </a:r>
+          </a:p>
+          <a:p>
+            <a:r>
+              <a:rPr lang="en-US" sz="2000" dirty="0" err="1" smtClean="0">
+                <a:latin typeface="Monaco"/>
+                <a:cs typeface="Monaco"/>
+              </a:rPr>
+              <a:t>seq_record</a:t>
+            </a:r>
+            <a:r>
+              <a:rPr lang="en-US" sz="2000" dirty="0" smtClean="0">
+                <a:latin typeface="Monaco"/>
+                <a:cs typeface="Monaco"/>
+              </a:rPr>
+              <a:t> = </a:t>
+            </a:r>
+            <a:r>
+              <a:rPr lang="en-US" sz="2000" dirty="0" err="1" smtClean="0">
+                <a:latin typeface="Monaco"/>
+                <a:cs typeface="Monaco"/>
+              </a:rPr>
+              <a:t>SeqRecord</a:t>
+            </a:r>
+            <a:r>
+              <a:rPr lang="en-US" sz="2000" dirty="0" smtClean="0">
+                <a:latin typeface="Monaco"/>
+                <a:cs typeface="Monaco"/>
+              </a:rPr>
+              <a:t>(</a:t>
+            </a:r>
+            <a:r>
+              <a:rPr lang="en-US" sz="2000" dirty="0" err="1" smtClean="0">
+                <a:latin typeface="Monaco"/>
+                <a:cs typeface="Monaco"/>
+              </a:rPr>
               <a:t>seq_object</a:t>
             </a:r>
             <a:r>
@@ -12319,152 +12061,66 @@
                 <a:latin typeface="Monaco"/>
                 <a:cs typeface="Monaco"/>
               </a:rPr>
-              <a:t> = </a:t>
+              <a:t>, id = "</a:t>
             </a:r>
             <a:r>
               <a:rPr lang="en-US" sz="2000" dirty="0" err="1" smtClean="0">
                 <a:latin typeface="Monaco"/>
                 <a:cs typeface="Monaco"/>
               </a:rPr>
-              <a:t>Seq</a:t>
+              <a:t>my_id</a:t>
             </a:r>
             <a:r>
               <a:rPr lang="en-US" sz="2000" dirty="0" smtClean="0">
                 <a:latin typeface="Monaco"/>
                 <a:cs typeface="Monaco"/>
               </a:rPr>
-              <a:t>(&lt;some sequence&gt;)</a:t>
-            </a:r>
-          </a:p>
-          <a:p>
-            <a:r>
-              <a:rPr lang="en-US" sz="2000" dirty="0">
-                <a:latin typeface="Monaco"/>
-                <a:cs typeface="Monaco"/>
-              </a:rPr>
-              <a:t>	</a:t>
-            </a:r>
-            <a:r>
-              <a:rPr lang="en-US" sz="2000" dirty="0" err="1" smtClean="0">
-                <a:latin typeface="Monaco"/>
-                <a:cs typeface="Monaco"/>
-              </a:rPr>
-              <a:t>seq_record</a:t>
-            </a:r>
-            <a:r>
-              <a:rPr lang="en-US" sz="2000" dirty="0">
-                <a:latin typeface="Monaco"/>
-                <a:cs typeface="Monaco"/>
-              </a:rPr>
-              <a:t> </a:t>
-            </a:r>
-            <a:r>
-              <a:rPr lang="en-US" sz="2000" dirty="0" smtClean="0">
-                <a:latin typeface="Monaco"/>
-                <a:cs typeface="Monaco"/>
-              </a:rPr>
-              <a:t>= </a:t>
-            </a:r>
-            <a:r>
-              <a:rPr lang="en-US" sz="2000" dirty="0" err="1" smtClean="0">
-                <a:latin typeface="Monaco"/>
-                <a:cs typeface="Monaco"/>
-              </a:rPr>
-              <a:t>SeqRecord</a:t>
-            </a:r>
-            <a:r>
-              <a:rPr lang="en-US" sz="2000" dirty="0" smtClean="0">
-                <a:latin typeface="Monaco"/>
-                <a:cs typeface="Monaco"/>
-              </a:rPr>
-              <a:t>(</a:t>
-            </a:r>
-            <a:r>
-              <a:rPr lang="en-US" sz="2000" dirty="0" err="1" smtClean="0">
-                <a:latin typeface="Monaco"/>
-                <a:cs typeface="Monaco"/>
-              </a:rPr>
-              <a:t>seq_object</a:t>
-            </a:r>
-            <a:r>
-              <a:rPr lang="en-US" sz="2000" dirty="0" smtClean="0">
-                <a:latin typeface="Monaco"/>
-                <a:cs typeface="Monaco"/>
-              </a:rPr>
-              <a:t>, id = &lt;</a:t>
-            </a:r>
-            <a:r>
-              <a:rPr lang="en-US" sz="2000" dirty="0" err="1" smtClean="0">
-                <a:latin typeface="Monaco"/>
-                <a:cs typeface="Monaco"/>
-              </a:rPr>
-              <a:t>some_id</a:t>
-            </a:r>
-            <a:r>
-              <a:rPr lang="en-US" sz="2000" dirty="0" smtClean="0">
-                <a:latin typeface="Monaco"/>
-                <a:cs typeface="Monaco"/>
-              </a:rPr>
-              <a:t>&gt;)</a:t>
-            </a:r>
-          </a:p>
-          <a:p>
-            <a:r>
-              <a:rPr lang="en-US" sz="2000" dirty="0" smtClean="0">
-                <a:latin typeface="Monaco"/>
-                <a:cs typeface="Monaco"/>
-              </a:rPr>
-              <a:t>	</a:t>
-            </a:r>
-            <a:r>
-              <a:rPr lang="en-US" sz="2000" dirty="0" err="1" smtClean="0">
-                <a:latin typeface="Monaco"/>
-                <a:cs typeface="Monaco"/>
-              </a:rPr>
-              <a:t>recs.append</a:t>
-            </a:r>
-            <a:r>
-              <a:rPr lang="en-US" sz="2000" dirty="0" smtClean="0">
-                <a:latin typeface="Monaco"/>
-                <a:cs typeface="Monaco"/>
-              </a:rPr>
-              <a:t>(</a:t>
-            </a:r>
-            <a:r>
-              <a:rPr lang="en-US" sz="2000" dirty="0" err="1" smtClean="0">
-                <a:latin typeface="Monaco"/>
-                <a:cs typeface="Monaco"/>
-              </a:rPr>
-              <a:t>seq_record</a:t>
-            </a:r>
-            <a:r>
-              <a:rPr lang="en-US" sz="2000" dirty="0" smtClean="0">
-                <a:latin typeface="Monaco"/>
-                <a:cs typeface="Monaco"/>
-              </a:rPr>
-              <a:t>)</a:t>
-            </a:r>
-          </a:p>
-          <a:p>
-            <a:endParaRPr lang="en-US" sz="2000" dirty="0">
+              <a:t>")</a:t>
+            </a:r>
+          </a:p>
+          <a:p>
+            <a:endParaRPr lang="en-US" sz="2000" dirty="0" smtClean="0">
               <a:latin typeface="Monaco"/>
               <a:cs typeface="Monaco"/>
             </a:endParaRPr>
           </a:p>
           <a:p>
             <a:r>
+              <a:rPr lang="en-US" sz="2000" dirty="0" smtClean="0">
+                <a:latin typeface="Monaco"/>
+                <a:cs typeface="Monaco"/>
+              </a:rPr>
+              <a:t># Write it to a file</a:t>
+            </a:r>
+          </a:p>
+          <a:p>
+            <a:r>
+              <a:rPr lang="en-US" sz="2000" smtClean="0">
+                <a:latin typeface="Monaco"/>
+                <a:cs typeface="Monaco"/>
+              </a:rPr>
+              <a:t>SeqIO.write</a:t>
+            </a:r>
+            <a:r>
+              <a:rPr lang="en-US" sz="2000" dirty="0" smtClean="0">
+                <a:latin typeface="Monaco"/>
+                <a:cs typeface="Monaco"/>
+              </a:rPr>
+              <a:t>(</a:t>
+            </a:r>
+            <a:r>
               <a:rPr lang="en-US" sz="2000" dirty="0" err="1" smtClean="0">
                 <a:latin typeface="Monaco"/>
                 <a:cs typeface="Monaco"/>
               </a:rPr>
-              <a:t>SeqIO.write</a:t>
+              <a:t>seq_record</a:t>
             </a:r>
             <a:r>
               <a:rPr lang="en-US" sz="2000" dirty="0" smtClean="0">
                 <a:latin typeface="Monaco"/>
                 <a:cs typeface="Monaco"/>
               </a:rPr>
-              <a:t>(recs, </a:t>
+              <a:t>, </a:t>
             </a:r>
             <a:r>
               <a:rPr lang="en-US" sz="2000" dirty="0">
@@ -12507,7 +12163,7 @@
     </p:spTree>
     <p:extLst>
       <p:ext uri="{BB962C8B-B14F-4D97-AF65-F5344CB8AC3E}">
-        <p14:creationId xmlns:p14="http://schemas.microsoft.com/office/powerpoint/2010/main" val="1085934977"/>
+        <p14:creationId xmlns:p14="http://schemas.microsoft.com/office/powerpoint/2010/main" val="726321036"/>
       </p:ext>
     </p:extLst>
   </p:cSld>
@@ -12544,28 +12200,417 @@
             <p:ph type="title"/>
           </p:nvPr>
         </p:nvSpPr>
+        <p:spPr/>
+        <p:txBody>
+          <a:bodyPr/>
+          <a:lstStyle/>
+          <a:p>
+            <a:r>
+              <a:rPr lang="en-US" smtClean="0"/>
+              <a:t>Writing multiple sequences to a file</a:t>
+            </a:r>
+            <a:endParaRPr lang="en-US" dirty="0"/>
+          </a:p>
+        </p:txBody>
+      </p:sp>
+      <p:sp>
+        <p:nvSpPr>
+          <p:cNvPr id="5" name="TextBox 4"/>
+          <p:cNvSpPr txBox="1"/>
+          <p:nvPr/>
+        </p:nvSpPr>
         <p:spPr>
           <a:xfrm>
-            <a:off x="2230714" y="3087537"/>
-            <a:ext cx="4688183" cy="692215"/>
+            <a:off x="1904939" y="858352"/>
+            <a:ext cx="184666" cy="369332"/>
           </a:xfrm>
+          <a:prstGeom prst="rect">
+            <a:avLst/>
+          </a:prstGeom>
+          <a:noFill/>
         </p:spPr>
         <p:txBody>
-          <a:bodyPr/>
-          <a:lstStyle/>
-          <a:p>
-            <a:r>
-              <a:rPr lang="en-US" dirty="0" smtClean="0"/>
-              <a:t>exercise break</a:t>
-            </a:r>
+          <a:bodyPr wrap="none" rtlCol="0">
+            <a:spAutoFit/>
+          </a:bodyPr>
+          <a:lstStyle/>
+          <a:p>
             <a:endParaRPr lang="en-US" dirty="0"/>
+          </a:p>
+        </p:txBody>
+      </p:sp>
+      <p:sp>
+        <p:nvSpPr>
+          <p:cNvPr id="6" name="TextBox 5"/>
+          <p:cNvSpPr txBox="1"/>
+          <p:nvPr/>
+        </p:nvSpPr>
+        <p:spPr>
+          <a:xfrm>
+            <a:off x="286449" y="1932084"/>
+            <a:ext cx="8662059" cy="3785652"/>
+          </a:xfrm>
+          <a:prstGeom prst="rect">
+            <a:avLst/>
+          </a:prstGeom>
+          <a:noFill/>
+        </p:spPr>
+        <p:txBody>
+          <a:bodyPr wrap="square" rtlCol="0">
+            <a:spAutoFit/>
+          </a:bodyPr>
+          <a:lstStyle/>
+          <a:p>
+            <a:r>
+              <a:rPr lang="en-US" sz="2000" dirty="0" smtClean="0">
+                <a:latin typeface="Monaco"/>
+                <a:cs typeface="Monaco"/>
+              </a:rPr>
+              <a:t>from </a:t>
+            </a:r>
+            <a:r>
+              <a:rPr lang="en-US" sz="2000" dirty="0" err="1" smtClean="0">
+                <a:latin typeface="Monaco"/>
+                <a:cs typeface="Monaco"/>
+              </a:rPr>
+              <a:t>Bio.Seq</a:t>
+            </a:r>
+            <a:r>
+              <a:rPr lang="en-US" sz="2000" dirty="0" smtClean="0">
+                <a:latin typeface="Monaco"/>
+                <a:cs typeface="Monaco"/>
+              </a:rPr>
+              <a:t> import </a:t>
+            </a:r>
+            <a:r>
+              <a:rPr lang="en-US" sz="2000" dirty="0" err="1" smtClean="0">
+                <a:latin typeface="Monaco"/>
+                <a:cs typeface="Monaco"/>
+              </a:rPr>
+              <a:t>Seq</a:t>
+            </a:r>
+            <a:endParaRPr lang="en-US" sz="2000" dirty="0" smtClean="0">
+              <a:latin typeface="Monaco"/>
+              <a:cs typeface="Monaco"/>
+            </a:endParaRPr>
+          </a:p>
+          <a:p>
+            <a:r>
+              <a:rPr lang="en-US" sz="2000" dirty="0" smtClean="0">
+                <a:latin typeface="Monaco"/>
+                <a:cs typeface="Monaco"/>
+              </a:rPr>
+              <a:t>from </a:t>
+            </a:r>
+            <a:r>
+              <a:rPr lang="en-US" sz="2000" dirty="0" err="1" smtClean="0">
+                <a:latin typeface="Monaco"/>
+                <a:cs typeface="Monaco"/>
+              </a:rPr>
+              <a:t>Bio.SecRecord</a:t>
+            </a:r>
+            <a:r>
+              <a:rPr lang="en-US" sz="2000" dirty="0" smtClean="0">
+                <a:latin typeface="Monaco"/>
+                <a:cs typeface="Monaco"/>
+              </a:rPr>
+              <a:t> import </a:t>
+            </a:r>
+            <a:r>
+              <a:rPr lang="en-US" sz="2000" dirty="0" err="1" smtClean="0">
+                <a:latin typeface="Monaco"/>
+                <a:cs typeface="Monaco"/>
+              </a:rPr>
+              <a:t>SeqRecord</a:t>
+            </a:r>
+            <a:endParaRPr lang="en-US" sz="2000" dirty="0">
+              <a:latin typeface="Monaco"/>
+              <a:cs typeface="Monaco"/>
+            </a:endParaRPr>
+          </a:p>
+          <a:p>
+            <a:r>
+              <a:rPr lang="en-US" sz="2000" dirty="0" smtClean="0">
+                <a:latin typeface="Monaco"/>
+                <a:cs typeface="Monaco"/>
+              </a:rPr>
+              <a:t>from Bio import </a:t>
+            </a:r>
+            <a:r>
+              <a:rPr lang="en-US" sz="2000" dirty="0" err="1" smtClean="0">
+                <a:latin typeface="Monaco"/>
+                <a:cs typeface="Monaco"/>
+              </a:rPr>
+              <a:t>SeqIO</a:t>
+            </a:r>
+            <a:endParaRPr lang="en-US" sz="2000" dirty="0" smtClean="0">
+              <a:latin typeface="Monaco"/>
+              <a:cs typeface="Monaco"/>
+            </a:endParaRPr>
+          </a:p>
+          <a:p>
+            <a:endParaRPr lang="en-US" sz="2000" dirty="0">
+              <a:latin typeface="Monaco"/>
+              <a:cs typeface="Monaco"/>
+            </a:endParaRPr>
+          </a:p>
+          <a:p>
+            <a:r>
+              <a:rPr lang="en-US" sz="2000" smtClean="0">
+                <a:latin typeface="Monaco"/>
+                <a:cs typeface="Monaco"/>
+              </a:rPr>
+              <a:t># Save lots of SeqRecord objects in a list!</a:t>
+            </a:r>
+          </a:p>
+          <a:p>
+            <a:r>
+              <a:rPr lang="en-US" sz="2000" smtClean="0">
+                <a:latin typeface="Monaco"/>
+                <a:cs typeface="Monaco"/>
+              </a:rPr>
+              <a:t>recs </a:t>
+            </a:r>
+            <a:r>
+              <a:rPr lang="en-US" sz="2000" dirty="0" smtClean="0">
+                <a:latin typeface="Monaco"/>
+                <a:cs typeface="Monaco"/>
+              </a:rPr>
+              <a:t>= []</a:t>
+            </a:r>
+          </a:p>
+          <a:p>
+            <a:r>
+              <a:rPr lang="en-US" sz="2000" dirty="0" smtClean="0">
+                <a:latin typeface="Monaco"/>
+                <a:cs typeface="Monaco"/>
+              </a:rPr>
+              <a:t>for </a:t>
+            </a:r>
+            <a:r>
+              <a:rPr lang="en-US" sz="2000" dirty="0" err="1" smtClean="0">
+                <a:latin typeface="Monaco"/>
+                <a:cs typeface="Monaco"/>
+              </a:rPr>
+              <a:t>i</a:t>
+            </a:r>
+            <a:r>
+              <a:rPr lang="en-US" sz="2000" dirty="0" smtClean="0">
+                <a:latin typeface="Monaco"/>
+                <a:cs typeface="Monaco"/>
+              </a:rPr>
+              <a:t> in range(10):</a:t>
+            </a:r>
+          </a:p>
+          <a:p>
+            <a:r>
+              <a:rPr lang="en-US" sz="2000" dirty="0">
+                <a:latin typeface="Monaco"/>
+                <a:cs typeface="Monaco"/>
+              </a:rPr>
+              <a:t>	</a:t>
+            </a:r>
+            <a:r>
+              <a:rPr lang="en-US" sz="2000" dirty="0" err="1" smtClean="0">
+                <a:latin typeface="Monaco"/>
+                <a:cs typeface="Monaco"/>
+              </a:rPr>
+              <a:t>seq_object</a:t>
+            </a:r>
+            <a:r>
+              <a:rPr lang="en-US" sz="2000" dirty="0" smtClean="0">
+                <a:latin typeface="Monaco"/>
+                <a:cs typeface="Monaco"/>
+              </a:rPr>
+              <a:t> = </a:t>
+            </a:r>
+            <a:r>
+              <a:rPr lang="en-US" sz="2000" dirty="0" err="1" smtClean="0">
+                <a:latin typeface="Monaco"/>
+                <a:cs typeface="Monaco"/>
+              </a:rPr>
+              <a:t>Seq</a:t>
+            </a:r>
+            <a:r>
+              <a:rPr lang="en-US" sz="2000" dirty="0" smtClean="0">
+                <a:latin typeface="Monaco"/>
+                <a:cs typeface="Monaco"/>
+              </a:rPr>
+              <a:t>(&lt;some sequence&gt;)</a:t>
+            </a:r>
+          </a:p>
+          <a:p>
+            <a:r>
+              <a:rPr lang="en-US" sz="2000" dirty="0">
+                <a:latin typeface="Monaco"/>
+                <a:cs typeface="Monaco"/>
+              </a:rPr>
+              <a:t>	</a:t>
+            </a:r>
+            <a:r>
+              <a:rPr lang="en-US" sz="2000" dirty="0" err="1" smtClean="0">
+                <a:latin typeface="Monaco"/>
+                <a:cs typeface="Monaco"/>
+              </a:rPr>
+              <a:t>seq_record</a:t>
+            </a:r>
+            <a:r>
+              <a:rPr lang="en-US" sz="2000" dirty="0">
+                <a:latin typeface="Monaco"/>
+                <a:cs typeface="Monaco"/>
+              </a:rPr>
+              <a:t> </a:t>
+            </a:r>
+            <a:r>
+              <a:rPr lang="en-US" sz="2000" dirty="0" smtClean="0">
+                <a:latin typeface="Monaco"/>
+                <a:cs typeface="Monaco"/>
+              </a:rPr>
+              <a:t>= </a:t>
+            </a:r>
+            <a:r>
+              <a:rPr lang="en-US" sz="2000" dirty="0" err="1" smtClean="0">
+                <a:latin typeface="Monaco"/>
+                <a:cs typeface="Monaco"/>
+              </a:rPr>
+              <a:t>SeqRecord</a:t>
+            </a:r>
+            <a:r>
+              <a:rPr lang="en-US" sz="2000" dirty="0" smtClean="0">
+                <a:latin typeface="Monaco"/>
+                <a:cs typeface="Monaco"/>
+              </a:rPr>
+              <a:t>(</a:t>
+            </a:r>
+            <a:r>
+              <a:rPr lang="en-US" sz="2000" dirty="0" err="1" smtClean="0">
+                <a:latin typeface="Monaco"/>
+                <a:cs typeface="Monaco"/>
+              </a:rPr>
+              <a:t>seq_object</a:t>
+            </a:r>
+            <a:r>
+              <a:rPr lang="en-US" sz="2000" dirty="0" smtClean="0">
+                <a:latin typeface="Monaco"/>
+                <a:cs typeface="Monaco"/>
+              </a:rPr>
+              <a:t>, id = &lt;</a:t>
+            </a:r>
+            <a:r>
+              <a:rPr lang="en-US" sz="2000" dirty="0" err="1" smtClean="0">
+                <a:latin typeface="Monaco"/>
+                <a:cs typeface="Monaco"/>
+              </a:rPr>
+              <a:t>some_id</a:t>
+            </a:r>
+            <a:r>
+              <a:rPr lang="en-US" sz="2000" dirty="0" smtClean="0">
+                <a:latin typeface="Monaco"/>
+                <a:cs typeface="Monaco"/>
+              </a:rPr>
+              <a:t>&gt;)</a:t>
+            </a:r>
+          </a:p>
+          <a:p>
+            <a:r>
+              <a:rPr lang="en-US" sz="2000" dirty="0" smtClean="0">
+                <a:latin typeface="Monaco"/>
+                <a:cs typeface="Monaco"/>
+              </a:rPr>
+              <a:t>	</a:t>
+            </a:r>
+            <a:r>
+              <a:rPr lang="en-US" sz="2000" dirty="0" err="1" smtClean="0">
+                <a:latin typeface="Monaco"/>
+                <a:cs typeface="Monaco"/>
+              </a:rPr>
+              <a:t>recs.append</a:t>
+            </a:r>
+            <a:r>
+              <a:rPr lang="en-US" sz="2000" dirty="0" smtClean="0">
+                <a:latin typeface="Monaco"/>
+                <a:cs typeface="Monaco"/>
+              </a:rPr>
+              <a:t>(</a:t>
+            </a:r>
+            <a:r>
+              <a:rPr lang="en-US" sz="2000" dirty="0" err="1" smtClean="0">
+                <a:latin typeface="Monaco"/>
+                <a:cs typeface="Monaco"/>
+              </a:rPr>
+              <a:t>seq_record</a:t>
+            </a:r>
+            <a:r>
+              <a:rPr lang="en-US" sz="2000" dirty="0" smtClean="0">
+                <a:latin typeface="Monaco"/>
+                <a:cs typeface="Monaco"/>
+              </a:rPr>
+              <a:t>)</a:t>
+            </a:r>
+          </a:p>
+          <a:p>
+            <a:endParaRPr lang="en-US" sz="2000" dirty="0">
+              <a:latin typeface="Monaco"/>
+              <a:cs typeface="Monaco"/>
+            </a:endParaRPr>
+          </a:p>
+          <a:p>
+            <a:r>
+              <a:rPr lang="en-US" sz="2000" dirty="0" err="1" smtClean="0">
+                <a:latin typeface="Monaco"/>
+                <a:cs typeface="Monaco"/>
+              </a:rPr>
+              <a:t>SeqIO.write</a:t>
+            </a:r>
+            <a:r>
+              <a:rPr lang="en-US" sz="2000" dirty="0" smtClean="0">
+                <a:latin typeface="Monaco"/>
+                <a:cs typeface="Monaco"/>
+              </a:rPr>
+              <a:t>(recs, </a:t>
+            </a:r>
+            <a:r>
+              <a:rPr lang="en-US" sz="2000" dirty="0">
+                <a:latin typeface="Monaco"/>
+                <a:cs typeface="Monaco"/>
+              </a:rPr>
+              <a:t>"</a:t>
+            </a:r>
+            <a:r>
+              <a:rPr lang="en-US" sz="2000" dirty="0" err="1">
+                <a:latin typeface="Monaco"/>
+                <a:cs typeface="Monaco"/>
+              </a:rPr>
+              <a:t>outfile.fasta</a:t>
+            </a:r>
+            <a:r>
+              <a:rPr lang="en-US" sz="2000" dirty="0" smtClean="0">
+                <a:latin typeface="Monaco"/>
+                <a:cs typeface="Monaco"/>
+              </a:rPr>
+              <a:t>", "</a:t>
+            </a:r>
+            <a:r>
+              <a:rPr lang="en-US" sz="2000" dirty="0" err="1" smtClean="0">
+                <a:latin typeface="Monaco"/>
+                <a:cs typeface="Monaco"/>
+              </a:rPr>
+              <a:t>fasta</a:t>
+            </a:r>
+            <a:r>
+              <a:rPr lang="en-US" sz="2000" dirty="0" smtClean="0">
+                <a:latin typeface="Monaco"/>
+                <a:cs typeface="Monaco"/>
+              </a:rPr>
+              <a:t>")</a:t>
+            </a:r>
           </a:p>
         </p:txBody>
       </p:sp>
     </p:spTree>
     <p:extLst>
       <p:ext uri="{BB962C8B-B14F-4D97-AF65-F5344CB8AC3E}">
-        <p14:creationId xmlns:p14="http://schemas.microsoft.com/office/powerpoint/2010/main" val="4207585177"/>
+        <p14:creationId xmlns:p14="http://schemas.microsoft.com/office/powerpoint/2010/main" val="1085934977"/>
       </p:ext>
     </p:extLst>
   </p:cSld>
@@ -12602,74 +12647,28 @@
             <p:ph type="title"/>
           </p:nvPr>
         </p:nvSpPr>
-        <p:spPr/>
+        <p:spPr>
+          <a:xfrm>
+            <a:off x="2230714" y="3087537"/>
+            <a:ext cx="4688183" cy="692215"/>
+          </a:xfrm>
+        </p:spPr>
         <p:txBody>
           <a:bodyPr/>
           <a:lstStyle/>
           <a:p>
             <a:r>
               <a:rPr lang="en-US" dirty="0" smtClean="0"/>
-              <a:t>scripting</a:t>
+              <a:t>exercise break</a:t>
             </a:r>
             <a:endParaRPr lang="en-US" dirty="0"/>
-          </a:p>
-        </p:txBody>
-      </p:sp>
-      <p:sp>
-        <p:nvSpPr>
-          <p:cNvPr id="3" name="Content Placeholder 2"/>
-          <p:cNvSpPr>
-            <a:spLocks noGrp="1"/>
-          </p:cNvSpPr>
-          <p:nvPr>
-            <p:ph idx="1"/>
-          </p:nvPr>
-        </p:nvSpPr>
-        <p:spPr/>
-        <p:txBody>
-          <a:bodyPr/>
-          <a:lstStyle/>
-          <a:p>
-            <a:r>
-              <a:rPr lang="en-US" dirty="0" smtClean="0"/>
-              <a:t>For the remainder of the class, we will focus on writing scripts!</a:t>
-            </a:r>
-          </a:p>
-          <a:p>
-            <a:endParaRPr lang="en-US" dirty="0"/>
-          </a:p>
-          <a:p>
-            <a:r>
-              <a:rPr lang="en-US" dirty="0" smtClean="0"/>
-              <a:t>Goal:</a:t>
-            </a:r>
-          </a:p>
-          <a:p>
-            <a:pPr marL="457200" indent="-457200">
-              <a:buFont typeface="Arial"/>
-              <a:buChar char="•"/>
-            </a:pPr>
-            <a:r>
-              <a:rPr lang="en-US" dirty="0" smtClean="0"/>
-              <a:t>Parse sequence data files and extract meaningful information </a:t>
-            </a:r>
-          </a:p>
-          <a:p>
-            <a:pPr marL="457200" indent="-457200">
-              <a:buFont typeface="Arial"/>
-              <a:buChar char="•"/>
-            </a:pPr>
-            <a:r>
-              <a:rPr lang="en-US" dirty="0" smtClean="0"/>
-              <a:t>Perform some calculations</a:t>
-            </a:r>
           </a:p>
         </p:txBody>
       </p:sp>
     </p:spTree>
     <p:extLst>
       <p:ext uri="{BB962C8B-B14F-4D97-AF65-F5344CB8AC3E}">
-        <p14:creationId xmlns:p14="http://schemas.microsoft.com/office/powerpoint/2010/main" val="1028846082"/>
+        <p14:creationId xmlns:p14="http://schemas.microsoft.com/office/powerpoint/2010/main" val="4207585177"/>
       </p:ext>
     </p:extLst>
   </p:cSld>
@@ -12713,7 +12712,7 @@
           <a:p>
             <a:r>
               <a:rPr lang="en-US" dirty="0" smtClean="0"/>
-              <a:t>Script #1</a:t>
+              <a:t>scripting</a:t>
             </a:r>
             <a:endParaRPr lang="en-US" dirty="0"/>
           </a:p>
@@ -12735,33 +12734,45 @@
           <a:lstStyle/>
           <a:p>
             <a:r>
-              <a:rPr lang="en-US" dirty="0"/>
-              <a:t>Determine the average </a:t>
-            </a:r>
-            <a:r>
-              <a:rPr lang="en-US" i="1" dirty="0"/>
-              <a:t>GC-content </a:t>
-            </a:r>
-            <a:r>
-              <a:rPr lang="en-US" dirty="0"/>
-              <a:t>for all sequences in a given file</a:t>
-            </a:r>
-          </a:p>
-          <a:p>
-            <a:endParaRPr lang="en-US" dirty="0" smtClean="0"/>
+              <a:rPr lang="en-US" dirty="0" smtClean="0"/>
+              <a:t>For the remainder of the class, we will focus on writing scripts!</a:t>
+            </a:r>
           </a:p>
           <a:p>
             <a:endParaRPr lang="en-US" dirty="0"/>
           </a:p>
           <a:p>
-            <a:endParaRPr lang="en-US" dirty="0"/>
+            <a:r>
+              <a:rPr lang="en-US" dirty="0" smtClean="0"/>
+              <a:t>Goal:</a:t>
+            </a:r>
+          </a:p>
+          <a:p>
+            <a:pPr marL="457200" indent="-457200">
+              <a:buFont typeface="Arial"/>
+              <a:buChar char="•"/>
+            </a:pPr>
+            <a:r>
+              <a:rPr lang="en-US" dirty="0" smtClean="0"/>
+              <a:t>Parse sequence data files and extract meaningful information </a:t>
+            </a:r>
+          </a:p>
+          <a:p>
+            <a:pPr marL="457200" indent="-457200">
+              <a:buFont typeface="Arial"/>
+              <a:buChar char="•"/>
+            </a:pPr>
+            <a:r>
+              <a:rPr lang="en-US" dirty="0" smtClean="0"/>
+              <a:t>Perform some calculations</a:t>
+            </a:r>
           </a:p>
         </p:txBody>
       </p:sp>
     </p:spTree>
     <p:extLst>
       <p:ext uri="{BB962C8B-B14F-4D97-AF65-F5344CB8AC3E}">
-        <p14:creationId xmlns:p14="http://schemas.microsoft.com/office/powerpoint/2010/main" val="81387370"/>
+        <p14:creationId xmlns:p14="http://schemas.microsoft.com/office/powerpoint/2010/main" val="1028846082"/>
       </p:ext>
     </p:extLst>
   </p:cSld>
@@ -12827,73 +12838,19 @@
           <a:lstStyle/>
           <a:p>
             <a:r>
-              <a:rPr lang="en-US" dirty="0" smtClean="0"/>
-              <a:t>Determine </a:t>
-            </a:r>
-            <a:r>
               <a:rPr lang="en-US" dirty="0"/>
-              <a:t>the </a:t>
-            </a:r>
-            <a:r>
-              <a:rPr lang="en-US" dirty="0" smtClean="0"/>
-              <a:t>average </a:t>
-            </a:r>
-            <a:r>
-              <a:rPr lang="en-US" i="1" dirty="0" smtClean="0"/>
+              <a:t>Determine the average </a:t>
+            </a:r>
+            <a:r>
+              <a:rPr lang="en-US" i="1" dirty="0"/>
               <a:t>GC-content </a:t>
             </a:r>
             <a:r>
-              <a:rPr lang="en-US" dirty="0" smtClean="0"/>
+              <a:rPr lang="en-US" dirty="0"/>
               <a:t>for all sequences in a given file</a:t>
             </a:r>
           </a:p>
           <a:p>
-            <a:pPr marL="971550" lvl="1" indent="-514350"/>
-            <a:r>
-              <a:rPr lang="en-US" dirty="0"/>
-              <a:t>Your script should include two functions:</a:t>
-            </a:r>
-          </a:p>
-          <a:p>
-            <a:pPr marL="1657350" lvl="2" indent="-514350"/>
-            <a:r>
-              <a:rPr lang="en-US" dirty="0"/>
-              <a:t>A function for reading in a sequence file</a:t>
-            </a:r>
-          </a:p>
-          <a:p>
-            <a:pPr marL="1657350" lvl="2" indent="-514350"/>
-            <a:r>
-              <a:rPr lang="en-US" dirty="0"/>
-              <a:t>A function for computing </a:t>
-            </a:r>
-            <a:r>
-              <a:rPr lang="en-US" dirty="0" smtClean="0"/>
-              <a:t>the GC-content for a </a:t>
-            </a:r>
-            <a:r>
-              <a:rPr lang="en-US" i="1" dirty="0" smtClean="0"/>
-              <a:t>single sequence </a:t>
-            </a:r>
-            <a:r>
-              <a:rPr lang="en-US" dirty="0" smtClean="0">
-                <a:solidFill>
-                  <a:schemeClr val="accent5"/>
-                </a:solidFill>
-              </a:rPr>
-              <a:t>(why?)</a:t>
-            </a:r>
-            <a:endParaRPr lang="en-US" dirty="0">
-              <a:solidFill>
-                <a:schemeClr val="accent5"/>
-              </a:solidFill>
-            </a:endParaRPr>
-          </a:p>
-          <a:p>
-            <a:pPr marL="514350" indent="-514350">
-              <a:buFont typeface="+mj-lt"/>
-              <a:buAutoNum type="arabicPeriod" startAt="2"/>
-            </a:pPr>
             <a:endParaRPr lang="en-US" dirty="0" smtClean="0"/>
           </a:p>
           <a:p>
@@ -12907,7 +12864,7 @@
     </p:spTree>
     <p:extLst>
       <p:ext uri="{BB962C8B-B14F-4D97-AF65-F5344CB8AC3E}">
-        <p14:creationId xmlns:p14="http://schemas.microsoft.com/office/powerpoint/2010/main" val="2044227144"/>
+        <p14:creationId xmlns:p14="http://schemas.microsoft.com/office/powerpoint/2010/main" val="81387370"/>
       </p:ext>
     </p:extLst>
   </p:cSld>
@@ -12951,7 +12908,7 @@
           <a:p>
             <a:r>
               <a:rPr lang="en-US" dirty="0" smtClean="0"/>
-              <a:t>Script #2</a:t>
+              <a:t>Script #1</a:t>
             </a:r>
             <a:endParaRPr lang="en-US" dirty="0"/>
           </a:p>
@@ -12973,24 +12930,87 @@
           <a:lstStyle/>
           <a:p>
             <a:r>
+              <a:rPr lang="en-US" dirty="0" smtClean="0"/>
+              <a:t>Determine </a:t>
+            </a:r>
+            <a:r>
               <a:rPr lang="en-US" dirty="0"/>
-              <a:t>Determine the </a:t>
-            </a:r>
-            <a:r>
-              <a:rPr lang="en-US" i="1" dirty="0"/>
-              <a:t>pairwise distance </a:t>
-            </a:r>
+              <a:t>the </a:t>
+            </a:r>
+            <a:r>
+              <a:rPr lang="en-US" dirty="0" smtClean="0"/>
+              <a:t>average </a:t>
+            </a:r>
+            <a:r>
+              <a:rPr lang="en-US" i="1" dirty="0" smtClean="0"/>
+              <a:t>GC-content </a:t>
+            </a:r>
+            <a:r>
+              <a:rPr lang="en-US" dirty="0" smtClean="0"/>
+              <a:t>for all sequences in a given file</a:t>
+            </a:r>
+          </a:p>
+          <a:p>
+            <a:pPr marL="971550" lvl="1" indent="-514350"/>
             <a:r>
               <a:rPr lang="en-US" dirty="0"/>
-              <a:t>between two sequences </a:t>
-            </a:r>
+              <a:t>Your script should include two functions:</a:t>
+            </a:r>
+          </a:p>
+          <a:p>
+            <a:pPr marL="1657350" lvl="2" indent="-514350"/>
+            <a:r>
+              <a:rPr lang="en-US" dirty="0"/>
+              <a:t>A function for reading in a sequence file</a:t>
+            </a:r>
+          </a:p>
+          <a:p>
+            <a:pPr marL="1657350" lvl="2" indent="-514350"/>
+            <a:r>
+              <a:rPr lang="en-US" dirty="0"/>
+              <a:t>A function for computing </a:t>
+            </a:r>
+            <a:r>
+              <a:rPr lang="en-US" dirty="0" smtClean="0"/>
+              <a:t>the GC-content for a </a:t>
+            </a:r>
+            <a:r>
+              <a:rPr lang="en-US" i="1" dirty="0" smtClean="0"/>
+              <a:t>single sequence </a:t>
+            </a:r>
+            <a:r>
+              <a:rPr lang="en-US" dirty="0" smtClean="0">
+                <a:solidFill>
+                  <a:schemeClr val="accent5"/>
+                </a:solidFill>
+              </a:rPr>
+              <a:t>(why?)</a:t>
+            </a:r>
+            <a:endParaRPr lang="en-US" dirty="0">
+              <a:solidFill>
+                <a:schemeClr val="accent5"/>
+              </a:solidFill>
+            </a:endParaRPr>
+          </a:p>
+          <a:p>
+            <a:pPr marL="514350" indent="-514350">
+              <a:buFont typeface="+mj-lt"/>
+              <a:buAutoNum type="arabicPeriod" startAt="2"/>
+            </a:pPr>
+            <a:endParaRPr lang="en-US" dirty="0" smtClean="0"/>
+          </a:p>
+          <a:p>
+            <a:endParaRPr lang="en-US" dirty="0"/>
+          </a:p>
+          <a:p>
+            <a:endParaRPr lang="en-US" dirty="0"/>
           </a:p>
         </p:txBody>
       </p:sp>
     </p:spTree>
     <p:extLst>
       <p:ext uri="{BB962C8B-B14F-4D97-AF65-F5344CB8AC3E}">
-        <p14:creationId xmlns:p14="http://schemas.microsoft.com/office/powerpoint/2010/main" val="3500402009"/>
+        <p14:creationId xmlns:p14="http://schemas.microsoft.com/office/powerpoint/2010/main" val="2044227144"/>
       </p:ext>
     </p:extLst>
   </p:cSld>
@@ -13070,51 +13090,10 @@
           </a:p>
         </p:txBody>
       </p:sp>
-      <p:sp>
-        <p:nvSpPr>
-          <p:cNvPr id="4" name="TextBox 3"/>
-          <p:cNvSpPr txBox="1"/>
-          <p:nvPr/>
-        </p:nvSpPr>
-        <p:spPr>
-          <a:xfrm>
-            <a:off x="3448439" y="2892195"/>
-            <a:ext cx="1653765" cy="892552"/>
-          </a:xfrm>
-          <a:prstGeom prst="rect">
-            <a:avLst/>
-          </a:prstGeom>
-          <a:noFill/>
-        </p:spPr>
-        <p:txBody>
-          <a:bodyPr wrap="square" rtlCol="0">
-            <a:spAutoFit/>
-          </a:bodyPr>
-          <a:lstStyle/>
-          <a:p>
-            <a:r>
-              <a:rPr lang="en-US" sz="2600" dirty="0" smtClean="0">
-                <a:latin typeface="Monaco"/>
-                <a:cs typeface="Monaco"/>
-              </a:rPr>
-              <a:t>ACGTAAA</a:t>
-            </a:r>
-          </a:p>
-          <a:p>
-            <a:r>
-              <a:rPr lang="en-US" sz="2600" dirty="0" smtClean="0">
-                <a:latin typeface="Monaco"/>
-                <a:cs typeface="Monaco"/>
-              </a:rPr>
-              <a:t>AGGTAAT</a:t>
-            </a:r>
-          </a:p>
-        </p:txBody>
-      </p:sp>
     </p:spTree>
     <p:extLst>
       <p:ext uri="{BB962C8B-B14F-4D97-AF65-F5344CB8AC3E}">
-        <p14:creationId xmlns:p14="http://schemas.microsoft.com/office/powerpoint/2010/main" val="115094946"/>
+        <p14:creationId xmlns:p14="http://schemas.microsoft.com/office/powerpoint/2010/main" val="3500402009"/>
       </p:ext>
     </p:extLst>
   </p:cSld>
@@ -13221,128 +13200,24 @@
                 <a:latin typeface="Monaco"/>
                 <a:cs typeface="Monaco"/>
               </a:rPr>
-              <a:t>A</a:t>
-            </a:r>
+              <a:t>ACGTAAA</a:t>
+            </a:r>
+          </a:p>
+          <a:p>
             <a:r>
               <a:rPr lang="en-US" sz="2600" dirty="0" smtClean="0">
-                <a:solidFill>
-                  <a:schemeClr val="tx2"/>
-                </a:solidFill>
-                <a:latin typeface="Monaco"/>
-                <a:cs typeface="Monaco"/>
-              </a:rPr>
-              <a:t>C</a:t>
-            </a:r>
-            <a:r>
-              <a:rPr lang="en-US" sz="2600" dirty="0" smtClean="0">
-                <a:latin typeface="Monaco"/>
-                <a:cs typeface="Monaco"/>
-              </a:rPr>
-              <a:t>GTAA</a:t>
-            </a:r>
-            <a:r>
-              <a:rPr lang="en-US" sz="2600" dirty="0" smtClean="0">
-                <a:solidFill>
-                  <a:srgbClr val="D1282E"/>
-                </a:solidFill>
-                <a:latin typeface="Monaco"/>
-                <a:cs typeface="Monaco"/>
-              </a:rPr>
-              <a:t>A</a:t>
-            </a:r>
-          </a:p>
-          <a:p>
-            <a:r>
-              <a:rPr lang="en-US" sz="2600" dirty="0" smtClean="0">
-                <a:latin typeface="Monaco"/>
-                <a:cs typeface="Monaco"/>
-              </a:rPr>
-              <a:t>A</a:t>
-            </a:r>
-            <a:r>
-              <a:rPr lang="en-US" sz="2600" dirty="0" smtClean="0">
-                <a:solidFill>
-                  <a:srgbClr val="D1282E"/>
-                </a:solidFill>
-                <a:latin typeface="Monaco"/>
-                <a:cs typeface="Monaco"/>
-              </a:rPr>
-              <a:t>G</a:t>
-            </a:r>
-            <a:r>
-              <a:rPr lang="en-US" sz="2600" dirty="0" smtClean="0">
-                <a:latin typeface="Monaco"/>
-                <a:cs typeface="Monaco"/>
-              </a:rPr>
-              <a:t>GTAA</a:t>
-            </a:r>
-            <a:r>
-              <a:rPr lang="en-US" sz="2600" dirty="0" smtClean="0">
-                <a:solidFill>
-                  <a:srgbClr val="D1282E"/>
-                </a:solidFill>
-                <a:latin typeface="Monaco"/>
-                <a:cs typeface="Monaco"/>
-              </a:rPr>
-              <a:t>T</a:t>
-            </a:r>
-          </a:p>
-        </p:txBody>
-      </p:sp>
-      <p:sp>
-        <p:nvSpPr>
-          <p:cNvPr id="5" name="TextBox 4"/>
-          <p:cNvSpPr txBox="1"/>
-          <p:nvPr/>
-        </p:nvSpPr>
-        <p:spPr>
-          <a:xfrm>
-            <a:off x="5279738" y="3015306"/>
-            <a:ext cx="3421834" cy="769441"/>
-          </a:xfrm>
-          <a:prstGeom prst="rect">
-            <a:avLst/>
-          </a:prstGeom>
-          <a:noFill/>
-        </p:spPr>
-        <p:txBody>
-          <a:bodyPr wrap="square" rtlCol="0">
-            <a:spAutoFit/>
-          </a:bodyPr>
-          <a:lstStyle/>
-          <a:p>
-            <a:r>
-              <a:rPr lang="en-US" sz="2200" dirty="0" smtClean="0">
-                <a:solidFill>
-                  <a:srgbClr val="DC5924"/>
-                </a:solidFill>
-              </a:rPr>
-              <a:t>Distance = #diff / length  =</a:t>
-            </a:r>
-          </a:p>
-          <a:p>
-            <a:r>
-              <a:rPr lang="en-US" sz="2200" dirty="0" smtClean="0">
-                <a:solidFill>
-                  <a:srgbClr val="DC5924"/>
-                </a:solidFill>
-              </a:rPr>
-              <a:t> 2 / 7 = 0.286 </a:t>
-            </a:r>
-            <a:endParaRPr lang="en-US" sz="2200" dirty="0">
-              <a:solidFill>
-                <a:srgbClr val="DC5924"/>
-              </a:solidFill>
-              <a:latin typeface="Monaco"/>
-              <a:cs typeface="Monaco"/>
-            </a:endParaRPr>
+                <a:latin typeface="Monaco"/>
+                <a:cs typeface="Monaco"/>
+              </a:rPr>
+              <a:t>AGGTAAT</a:t>
+            </a:r>
           </a:p>
         </p:txBody>
       </p:sp>
     </p:spTree>
     <p:extLst>
       <p:ext uri="{BB962C8B-B14F-4D97-AF65-F5344CB8AC3E}">
-        <p14:creationId xmlns:p14="http://schemas.microsoft.com/office/powerpoint/2010/main" val="274318404"/>
+        <p14:creationId xmlns:p14="http://schemas.microsoft.com/office/powerpoint/2010/main" val="115094946"/>
       </p:ext>
     </p:extLst>
   </p:cSld>
@@ -13408,45 +13283,169 @@
           <a:lstStyle/>
           <a:p>
             <a:r>
-              <a:rPr lang="en-US" dirty="0" smtClean="0"/>
+              <a:rPr lang="en-US" dirty="0"/>
               <a:t>Determine the </a:t>
             </a:r>
             <a:r>
-              <a:rPr lang="en-US" i="1" dirty="0" smtClean="0"/>
+              <a:rPr lang="en-US" i="1" dirty="0"/>
               <a:t>pairwise distance </a:t>
             </a:r>
             <a:r>
-              <a:rPr lang="en-US" dirty="0" smtClean="0"/>
+              <a:rPr lang="en-US" dirty="0"/>
               <a:t>between two sequences </a:t>
             </a:r>
           </a:p>
-          <a:p>
-            <a:pPr marL="971550" lvl="1" indent="-514350"/>
-            <a:r>
-              <a:rPr lang="en-US" dirty="0" smtClean="0"/>
-              <a:t>Your script should include two functions:</a:t>
-            </a:r>
-          </a:p>
-          <a:p>
-            <a:pPr marL="1657350" lvl="2" indent="-514350"/>
-            <a:r>
-              <a:rPr lang="en-US" dirty="0" smtClean="0"/>
-              <a:t>A function for reading in a sequence file</a:t>
-            </a:r>
-          </a:p>
-          <a:p>
-            <a:pPr marL="1657350" lvl="2" indent="-514350"/>
-            <a:r>
-              <a:rPr lang="en-US" dirty="0" smtClean="0"/>
-              <a:t>A function for computing pair-wise distances</a:t>
-            </a:r>
+        </p:txBody>
+      </p:sp>
+      <p:sp>
+        <p:nvSpPr>
+          <p:cNvPr id="4" name="TextBox 3"/>
+          <p:cNvSpPr txBox="1"/>
+          <p:nvPr/>
+        </p:nvSpPr>
+        <p:spPr>
+          <a:xfrm>
+            <a:off x="3448439" y="2892195"/>
+            <a:ext cx="1653765" cy="892552"/>
+          </a:xfrm>
+          <a:prstGeom prst="rect">
+            <a:avLst/>
+          </a:prstGeom>
+          <a:noFill/>
+        </p:spPr>
+        <p:txBody>
+          <a:bodyPr wrap="square" rtlCol="0">
+            <a:spAutoFit/>
+          </a:bodyPr>
+          <a:lstStyle/>
+          <a:p>
+            <a:r>
+              <a:rPr lang="en-US" sz="2600" dirty="0" smtClean="0">
+                <a:latin typeface="Monaco"/>
+                <a:cs typeface="Monaco"/>
+              </a:rPr>
+              <a:t>A</a:t>
+            </a:r>
+            <a:r>
+              <a:rPr lang="en-US" sz="2600" dirty="0" smtClean="0">
+                <a:solidFill>
+                  <a:schemeClr val="tx2"/>
+                </a:solidFill>
+                <a:latin typeface="Monaco"/>
+                <a:cs typeface="Monaco"/>
+              </a:rPr>
+              <a:t>C</a:t>
+            </a:r>
+            <a:r>
+              <a:rPr lang="en-US" sz="2600" dirty="0" smtClean="0">
+                <a:latin typeface="Monaco"/>
+                <a:cs typeface="Monaco"/>
+              </a:rPr>
+              <a:t>GTAA</a:t>
+            </a:r>
+            <a:r>
+              <a:rPr lang="en-US" sz="2600" dirty="0" smtClean="0">
+                <a:solidFill>
+                  <a:srgbClr val="D1282E"/>
+                </a:solidFill>
+                <a:latin typeface="Monaco"/>
+                <a:cs typeface="Monaco"/>
+              </a:rPr>
+              <a:t>A</a:t>
+            </a:r>
+          </a:p>
+          <a:p>
+            <a:r>
+              <a:rPr lang="en-US" sz="2600" dirty="0" smtClean="0">
+                <a:latin typeface="Monaco"/>
+                <a:cs typeface="Monaco"/>
+              </a:rPr>
+              <a:t>A</a:t>
+            </a:r>
+            <a:r>
+              <a:rPr lang="en-US" sz="2600" dirty="0" smtClean="0">
+                <a:solidFill>
+                  <a:srgbClr val="D1282E"/>
+                </a:solidFill>
+                <a:latin typeface="Monaco"/>
+                <a:cs typeface="Monaco"/>
+              </a:rPr>
+              <a:t>G</a:t>
+            </a:r>
+            <a:r>
+              <a:rPr lang="en-US" sz="2600" dirty="0" smtClean="0">
+                <a:latin typeface="Monaco"/>
+                <a:cs typeface="Monaco"/>
+              </a:rPr>
+              <a:t>GTAA</a:t>
+            </a:r>
+            <a:r>
+              <a:rPr lang="en-US" sz="2600" dirty="0" smtClean="0">
+                <a:solidFill>
+                  <a:srgbClr val="D1282E"/>
+                </a:solidFill>
+                <a:latin typeface="Monaco"/>
+                <a:cs typeface="Monaco"/>
+              </a:rPr>
+              <a:t>T</a:t>
+            </a:r>
+          </a:p>
+        </p:txBody>
+      </p:sp>
+      <p:sp>
+        <p:nvSpPr>
+          <p:cNvPr id="5" name="TextBox 4"/>
+          <p:cNvSpPr txBox="1"/>
+          <p:nvPr/>
+        </p:nvSpPr>
+        <p:spPr>
+          <a:xfrm>
+            <a:off x="5279738" y="3015306"/>
+            <a:ext cx="3421834" cy="769441"/>
+          </a:xfrm>
+          <a:prstGeom prst="rect">
+            <a:avLst/>
+          </a:prstGeom>
+          <a:noFill/>
+        </p:spPr>
+        <p:txBody>
+          <a:bodyPr wrap="square" rtlCol="0">
+            <a:spAutoFit/>
+          </a:bodyPr>
+          <a:lstStyle/>
+          <a:p>
+            <a:r>
+              <a:rPr lang="en-US" sz="2200" dirty="0" smtClean="0">
+                <a:solidFill>
+                  <a:srgbClr val="DC5924"/>
+                </a:solidFill>
+              </a:rPr>
+              <a:t>Distance = #diff / length  =</a:t>
+            </a:r>
+          </a:p>
+          <a:p>
+            <a:r>
+              <a:rPr lang="en-US" sz="2200" dirty="0" smtClean="0">
+                <a:solidFill>
+                  <a:srgbClr val="DC5924"/>
+                </a:solidFill>
+              </a:rPr>
+              <a:t> 2 / 7 = 0.286 </a:t>
+            </a:r>
+            <a:endParaRPr lang="en-US" sz="2200" dirty="0">
+              <a:solidFill>
+                <a:srgbClr val="DC5924"/>
+              </a:solidFill>
+              <a:latin typeface="Monaco"/>
+              <a:cs typeface="Monaco"/>
+            </a:endParaRPr>
           </a:p>
         </p:txBody>
       </p:sp>
     </p:spTree>
     <p:extLst>
       <p:ext uri="{BB962C8B-B14F-4D97-AF65-F5344CB8AC3E}">
-        <p14:creationId xmlns:p14="http://schemas.microsoft.com/office/powerpoint/2010/main" val="3387817876"/>
+        <p14:creationId xmlns:p14="http://schemas.microsoft.com/office/powerpoint/2010/main" val="274318404"/>
       </p:ext>
     </p:extLst>
   </p:cSld>
@@ -13512,15 +13511,15 @@
           <a:lstStyle/>
           <a:p>
             <a:r>
-              <a:rPr lang="en-US" dirty="0"/>
+              <a:rPr lang="en-US" dirty="0" smtClean="0"/>
               <a:t>Determine the </a:t>
             </a:r>
             <a:r>
-              <a:rPr lang="en-US" i="1" dirty="0"/>
+              <a:rPr lang="en-US" i="1" dirty="0" smtClean="0"/>
               <a:t>pairwise distance </a:t>
             </a:r>
             <a:r>
-              <a:rPr lang="en-US" dirty="0"/>
+              <a:rPr lang="en-US" dirty="0" smtClean="0"/>
               <a:t>between two sequences </a:t>
             </a:r>
           </a:p>
@@ -13544,42 +13543,13 @@
               <a:rPr lang="en-US" dirty="0" smtClean="0"/>
               <a:t>A function for computing pair-wise distances</a:t>
             </a:r>
-          </a:p>
-          <a:p>
-            <a:pPr marL="971550" lvl="1" indent="-514350"/>
-            <a:endParaRPr lang="en-US" dirty="0"/>
-          </a:p>
-          <a:p>
-            <a:pPr marL="971550" lvl="1" indent="-514350"/>
-            <a:r>
-              <a:rPr lang="en-US" dirty="0" smtClean="0"/>
-              <a:t>Important considerations:</a:t>
-            </a:r>
-          </a:p>
-          <a:p>
-            <a:pPr marL="1657350" lvl="2" indent="-514350"/>
-            <a:r>
-              <a:rPr lang="en-US" dirty="0" smtClean="0"/>
-              <a:t>Allow for different sequence file formats</a:t>
-            </a:r>
-          </a:p>
-          <a:p>
-            <a:pPr marL="1657350" lvl="2" indent="-514350"/>
-            <a:r>
-              <a:rPr lang="en-US" dirty="0" smtClean="0"/>
-              <a:t>The sequences must be the same length</a:t>
-            </a:r>
-          </a:p>
-          <a:p>
-            <a:pPr marL="1657350" lvl="2" indent="-514350"/>
-            <a:endParaRPr lang="en-US" dirty="0" smtClean="0"/>
           </a:p>
         </p:txBody>
       </p:sp>
     </p:spTree>
     <p:extLst>
       <p:ext uri="{BB962C8B-B14F-4D97-AF65-F5344CB8AC3E}">
-        <p14:creationId xmlns:p14="http://schemas.microsoft.com/office/powerpoint/2010/main" val="1669645551"/>
+        <p14:creationId xmlns:p14="http://schemas.microsoft.com/office/powerpoint/2010/main" val="3387817876"/>
       </p:ext>
     </p:extLst>
   </p:cSld>
@@ -14108,6 +14078,139 @@
 </file>
 
 <file path=ppt/slides/slide50.xml><?xml version="1.0" encoding="utf-8"?>
+<p:sld xmlns:a="http://schemas.openxmlformats.org/drawingml/2006/main" xmlns:r="http://schemas.openxmlformats.org/officeDocument/2006/relationships" xmlns:p="http://schemas.openxmlformats.org/presentationml/2006/main">
+  <p:cSld>
+    <p:spTree>
+      <p:nvGrpSpPr>
+        <p:cNvPr id="1" name=""/>
+        <p:cNvGrpSpPr/>
+        <p:nvPr/>
+      </p:nvGrpSpPr>
+      <p:grpSpPr>
+        <a:xfrm>
+          <a:off x="0" y="0"/>
+          <a:ext cx="0" cy="0"/>
+          <a:chOff x="0" y="0"/>
+          <a:chExt cx="0" cy="0"/>
+        </a:xfrm>
+      </p:grpSpPr>
+      <p:sp>
+        <p:nvSpPr>
+          <p:cNvPr id="2" name="Title 1"/>
+          <p:cNvSpPr>
+            <a:spLocks noGrp="1"/>
+          </p:cNvSpPr>
+          <p:nvPr>
+            <p:ph type="title"/>
+          </p:nvPr>
+        </p:nvSpPr>
+        <p:spPr/>
+        <p:txBody>
+          <a:bodyPr/>
+          <a:lstStyle/>
+          <a:p>
+            <a:r>
+              <a:rPr lang="en-US" dirty="0" smtClean="0"/>
+              <a:t>Script #2</a:t>
+            </a:r>
+            <a:endParaRPr lang="en-US" dirty="0"/>
+          </a:p>
+        </p:txBody>
+      </p:sp>
+      <p:sp>
+        <p:nvSpPr>
+          <p:cNvPr id="3" name="Content Placeholder 2"/>
+          <p:cNvSpPr>
+            <a:spLocks noGrp="1"/>
+          </p:cNvSpPr>
+          <p:nvPr>
+            <p:ph idx="1"/>
+          </p:nvPr>
+        </p:nvSpPr>
+        <p:spPr/>
+        <p:txBody>
+          <a:bodyPr/>
+          <a:lstStyle/>
+          <a:p>
+            <a:r>
+              <a:rPr lang="en-US" dirty="0"/>
+              <a:t>Determine the </a:t>
+            </a:r>
+            <a:r>
+              <a:rPr lang="en-US" i="1" dirty="0"/>
+              <a:t>pairwise distance </a:t>
+            </a:r>
+            <a:r>
+              <a:rPr lang="en-US" dirty="0"/>
+              <a:t>between two sequences </a:t>
+            </a:r>
+          </a:p>
+          <a:p>
+            <a:pPr marL="971550" lvl="1" indent="-514350"/>
+            <a:r>
+              <a:rPr lang="en-US" dirty="0" smtClean="0"/>
+              <a:t>Your script should include two functions:</a:t>
+            </a:r>
+          </a:p>
+          <a:p>
+            <a:pPr marL="1657350" lvl="2" indent="-514350"/>
+            <a:r>
+              <a:rPr lang="en-US" dirty="0" smtClean="0"/>
+              <a:t>A function for reading in a sequence file</a:t>
+            </a:r>
+          </a:p>
+          <a:p>
+            <a:pPr marL="1657350" lvl="2" indent="-514350"/>
+            <a:r>
+              <a:rPr lang="en-US" dirty="0" smtClean="0"/>
+              <a:t>A function for computing pair-wise distances</a:t>
+            </a:r>
+          </a:p>
+          <a:p>
+            <a:pPr marL="971550" lvl="1" indent="-514350"/>
+            <a:endParaRPr lang="en-US" dirty="0"/>
+          </a:p>
+          <a:p>
+            <a:pPr marL="971550" lvl="1" indent="-514350"/>
+            <a:r>
+              <a:rPr lang="en-US" dirty="0" smtClean="0"/>
+              <a:t>Important considerations:</a:t>
+            </a:r>
+          </a:p>
+          <a:p>
+            <a:pPr marL="1657350" lvl="2" indent="-514350"/>
+            <a:r>
+              <a:rPr lang="en-US" dirty="0" smtClean="0"/>
+              <a:t>Allow for different sequence file formats</a:t>
+            </a:r>
+          </a:p>
+          <a:p>
+            <a:pPr marL="1657350" lvl="2" indent="-514350"/>
+            <a:r>
+              <a:rPr lang="en-US" dirty="0" smtClean="0"/>
+              <a:t>The sequences must be the same length</a:t>
+            </a:r>
+          </a:p>
+          <a:p>
+            <a:pPr marL="1657350" lvl="2" indent="-514350"/>
+            <a:endParaRPr lang="en-US" dirty="0" smtClean="0"/>
+          </a:p>
+        </p:txBody>
+      </p:sp>
+    </p:spTree>
+    <p:extLst>
+      <p:ext uri="{BB962C8B-B14F-4D97-AF65-F5344CB8AC3E}">
+        <p14:creationId xmlns:p14="http://schemas.microsoft.com/office/powerpoint/2010/main" val="1669645551"/>
+      </p:ext>
+    </p:extLst>
+  </p:cSld>
+  <p:clrMapOvr>
+    <a:masterClrMapping/>
+  </p:clrMapOvr>
+</p:sld>
+</file>
+
+<file path=ppt/slides/slide51.xml><?xml version="1.0" encoding="utf-8"?>
 <p:sld xmlns:a="http://schemas.openxmlformats.org/drawingml/2006/main" xmlns:r="http://schemas.openxmlformats.org/officeDocument/2006/relationships" xmlns:p="http://schemas.openxmlformats.org/presentationml/2006/main">
   <p:cSld>
     <p:spTree>

</xml_diff>